<commit_message>
Updated presentation, poster and modified code blocks to make easier to screenshot
</commit_message>
<xml_diff>
--- a/How do Satellites Help us Understand More About.pptx
+++ b/How do Satellites Help us Understand More About.pptx
@@ -10,8 +10,11 @@
     <p:sldId id="258" r:id="rId4"/>
     <p:sldId id="259" r:id="rId5"/>
     <p:sldId id="260" r:id="rId6"/>
-    <p:sldId id="261" r:id="rId7"/>
-    <p:sldId id="262" r:id="rId8"/>
+    <p:sldId id="264" r:id="rId7"/>
+    <p:sldId id="263" r:id="rId8"/>
+    <p:sldId id="261" r:id="rId9"/>
+    <p:sldId id="265" r:id="rId10"/>
+    <p:sldId id="262" r:id="rId11"/>
   </p:sldIdLst>
   <p:sldSz cx="12192000" cy="6858000"/>
   <p:notesSz cx="6858000" cy="9144000"/>
@@ -112,7 +115,18 @@
   </p:defaultTextStyle>
   <p:extLst>
     <p:ext uri="{EFAFB233-063F-42B5-8137-9DF3F51BA10A}">
-      <p15:sldGuideLst xmlns:p15="http://schemas.microsoft.com/office/powerpoint/2012/main"/>
+      <p15:sldGuideLst xmlns:p15="http://schemas.microsoft.com/office/powerpoint/2012/main">
+        <p15:guide id="1" orient="horz" pos="2160">
+          <p15:clr>
+            <a:srgbClr val="A4A3A4"/>
+          </p15:clr>
+        </p15:guide>
+        <p15:guide id="2" pos="3840">
+          <p15:clr>
+            <a:srgbClr val="A4A3A4"/>
+          </p15:clr>
+        </p15:guide>
+      </p15:sldGuideLst>
     </p:ext>
   </p:extLst>
 </p:presentation>
@@ -863,7 +877,7 @@
           <a:p>
             <a:fld id="{2479C9C7-25D8-47B2-9071-A6E800FCE19F}" type="datetimeFigureOut">
               <a:rPr lang="en-GB" smtClean="0"/>
-              <a:t>19/06/2017</a:t>
+              <a:t>04/07/2017</a:t>
             </a:fld>
             <a:endParaRPr lang="en-GB"/>
           </a:p>
@@ -1114,7 +1128,7 @@
           <a:p>
             <a:fld id="{2479C9C7-25D8-47B2-9071-A6E800FCE19F}" type="datetimeFigureOut">
               <a:rPr lang="en-GB" smtClean="0"/>
-              <a:t>19/06/2017</a:t>
+              <a:t>04/07/2017</a:t>
             </a:fld>
             <a:endParaRPr lang="en-GB"/>
           </a:p>
@@ -1428,7 +1442,7 @@
           <a:p>
             <a:fld id="{2479C9C7-25D8-47B2-9071-A6E800FCE19F}" type="datetimeFigureOut">
               <a:rPr lang="en-GB" smtClean="0"/>
-              <a:t>19/06/2017</a:t>
+              <a:t>04/07/2017</a:t>
             </a:fld>
             <a:endParaRPr lang="en-GB"/>
           </a:p>
@@ -1761,7 +1775,7 @@
           <a:p>
             <a:fld id="{2479C9C7-25D8-47B2-9071-A6E800FCE19F}" type="datetimeFigureOut">
               <a:rPr lang="en-GB" smtClean="0"/>
-              <a:t>19/06/2017</a:t>
+              <a:t>04/07/2017</a:t>
             </a:fld>
             <a:endParaRPr lang="en-GB"/>
           </a:p>
@@ -2075,7 +2089,7 @@
           <a:p>
             <a:fld id="{2479C9C7-25D8-47B2-9071-A6E800FCE19F}" type="datetimeFigureOut">
               <a:rPr lang="en-GB" smtClean="0"/>
-              <a:t>19/06/2017</a:t>
+              <a:t>04/07/2017</a:t>
             </a:fld>
             <a:endParaRPr lang="en-GB"/>
           </a:p>
@@ -2468,7 +2482,7 @@
           <a:p>
             <a:fld id="{2479C9C7-25D8-47B2-9071-A6E800FCE19F}" type="datetimeFigureOut">
               <a:rPr lang="en-GB" smtClean="0"/>
-              <a:t>19/06/2017</a:t>
+              <a:t>04/07/2017</a:t>
             </a:fld>
             <a:endParaRPr lang="en-GB"/>
           </a:p>
@@ -2638,7 +2652,7 @@
           <a:p>
             <a:fld id="{2479C9C7-25D8-47B2-9071-A6E800FCE19F}" type="datetimeFigureOut">
               <a:rPr lang="en-GB" smtClean="0"/>
-              <a:t>19/06/2017</a:t>
+              <a:t>04/07/2017</a:t>
             </a:fld>
             <a:endParaRPr lang="en-GB"/>
           </a:p>
@@ -2818,7 +2832,7 @@
           <a:p>
             <a:fld id="{2479C9C7-25D8-47B2-9071-A6E800FCE19F}" type="datetimeFigureOut">
               <a:rPr lang="en-GB" smtClean="0"/>
-              <a:t>19/06/2017</a:t>
+              <a:t>04/07/2017</a:t>
             </a:fld>
             <a:endParaRPr lang="en-GB"/>
           </a:p>
@@ -2988,7 +3002,7 @@
           <a:p>
             <a:fld id="{2479C9C7-25D8-47B2-9071-A6E800FCE19F}" type="datetimeFigureOut">
               <a:rPr lang="en-GB" smtClean="0"/>
-              <a:t>19/06/2017</a:t>
+              <a:t>04/07/2017</a:t>
             </a:fld>
             <a:endParaRPr lang="en-GB"/>
           </a:p>
@@ -3235,7 +3249,7 @@
           <a:p>
             <a:fld id="{2479C9C7-25D8-47B2-9071-A6E800FCE19F}" type="datetimeFigureOut">
               <a:rPr lang="en-GB" smtClean="0"/>
-              <a:t>19/06/2017</a:t>
+              <a:t>04/07/2017</a:t>
             </a:fld>
             <a:endParaRPr lang="en-GB"/>
           </a:p>
@@ -3467,7 +3481,7 @@
           <a:p>
             <a:fld id="{2479C9C7-25D8-47B2-9071-A6E800FCE19F}" type="datetimeFigureOut">
               <a:rPr lang="en-GB" smtClean="0"/>
-              <a:t>19/06/2017</a:t>
+              <a:t>04/07/2017</a:t>
             </a:fld>
             <a:endParaRPr lang="en-GB"/>
           </a:p>
@@ -3841,7 +3855,7 @@
           <a:p>
             <a:fld id="{2479C9C7-25D8-47B2-9071-A6E800FCE19F}" type="datetimeFigureOut">
               <a:rPr lang="en-GB" smtClean="0"/>
-              <a:t>19/06/2017</a:t>
+              <a:t>04/07/2017</a:t>
             </a:fld>
             <a:endParaRPr lang="en-GB"/>
           </a:p>
@@ -3964,7 +3978,7 @@
           <a:p>
             <a:fld id="{2479C9C7-25D8-47B2-9071-A6E800FCE19F}" type="datetimeFigureOut">
               <a:rPr lang="en-GB" smtClean="0"/>
-              <a:t>19/06/2017</a:t>
+              <a:t>04/07/2017</a:t>
             </a:fld>
             <a:endParaRPr lang="en-GB"/>
           </a:p>
@@ -4059,7 +4073,7 @@
           <a:p>
             <a:fld id="{2479C9C7-25D8-47B2-9071-A6E800FCE19F}" type="datetimeFigureOut">
               <a:rPr lang="en-GB" smtClean="0"/>
-              <a:t>19/06/2017</a:t>
+              <a:t>04/07/2017</a:t>
             </a:fld>
             <a:endParaRPr lang="en-GB"/>
           </a:p>
@@ -4314,7 +4328,7 @@
           <a:p>
             <a:fld id="{2479C9C7-25D8-47B2-9071-A6E800FCE19F}" type="datetimeFigureOut">
               <a:rPr lang="en-GB" smtClean="0"/>
-              <a:t>19/06/2017</a:t>
+              <a:t>04/07/2017</a:t>
             </a:fld>
             <a:endParaRPr lang="en-GB"/>
           </a:p>
@@ -4619,7 +4633,7 @@
           <a:p>
             <a:fld id="{2479C9C7-25D8-47B2-9071-A6E800FCE19F}" type="datetimeFigureOut">
               <a:rPr lang="en-GB" smtClean="0"/>
-              <a:t>19/06/2017</a:t>
+              <a:t>04/07/2017</a:t>
             </a:fld>
             <a:endParaRPr lang="en-GB"/>
           </a:p>
@@ -5321,7 +5335,7 @@
           <a:p>
             <a:fld id="{2479C9C7-25D8-47B2-9071-A6E800FCE19F}" type="datetimeFigureOut">
               <a:rPr lang="en-GB" smtClean="0"/>
-              <a:t>19/06/2017</a:t>
+              <a:t>04/07/2017</a:t>
             </a:fld>
             <a:endParaRPr lang="en-GB"/>
           </a:p>
@@ -5899,11 +5913,7 @@
             <a:pPr algn="ctr"/>
             <a:r>
               <a:rPr lang="en-GB" dirty="0" smtClean="0"/>
-              <a:t>By all members of </a:t>
-            </a:r>
-            <a:r>
-              <a:rPr lang="en-GB" dirty="0" smtClean="0"/>
-              <a:t>robot club in All Saints School 2017</a:t>
+              <a:t>By all members of robot club in All Saints School 2017</a:t>
             </a:r>
             <a:endParaRPr lang="en-GB" dirty="0"/>
           </a:p>
@@ -6065,6 +6075,271 @@
     <p:bldLst>
       <p:bldP spid="2" grpId="0"/>
       <p:bldP spid="3" grpId="0" build="p"/>
+    </p:bldLst>
+  </p:timing>
+</p:sld>
+</file>
+
+<file path=ppt/slides/slide10.xml><?xml version="1.0" encoding="utf-8"?>
+<p:sld xmlns:a="http://schemas.openxmlformats.org/drawingml/2006/main" xmlns:r="http://schemas.openxmlformats.org/officeDocument/2006/relationships" xmlns:p="http://schemas.openxmlformats.org/presentationml/2006/main">
+  <p:cSld>
+    <p:spTree>
+      <p:nvGrpSpPr>
+        <p:cNvPr id="1" name=""/>
+        <p:cNvGrpSpPr/>
+        <p:nvPr/>
+      </p:nvGrpSpPr>
+      <p:grpSpPr>
+        <a:xfrm>
+          <a:off x="0" y="0"/>
+          <a:ext cx="0" cy="0"/>
+          <a:chOff x="0" y="0"/>
+          <a:chExt cx="0" cy="0"/>
+        </a:xfrm>
+      </p:grpSpPr>
+      <p:pic>
+        <p:nvPicPr>
+          <p:cNvPr id="6154" name="Picture 10" descr="Image result for space"/>
+          <p:cNvPicPr>
+            <a:picLocks noChangeAspect="1" noChangeArrowheads="1"/>
+          </p:cNvPicPr>
+          <p:nvPr/>
+        </p:nvPicPr>
+        <p:blipFill>
+          <a:blip r:embed="rId2">
+            <a:extLst>
+              <a:ext uri="{28A0092B-C50C-407E-A947-70E740481C1C}">
+                <a14:useLocalDpi xmlns:a14="http://schemas.microsoft.com/office/drawing/2010/main" val="0"/>
+              </a:ext>
+            </a:extLst>
+          </a:blip>
+          <a:srcRect/>
+          <a:stretch>
+            <a:fillRect/>
+          </a:stretch>
+        </p:blipFill>
+        <p:spPr bwMode="auto">
+          <a:xfrm>
+            <a:off x="0" y="0"/>
+            <a:ext cx="12192000" cy="6883715"/>
+          </a:xfrm>
+          <a:prstGeom prst="rect">
+            <a:avLst/>
+          </a:prstGeom>
+          <a:noFill/>
+          <a:extLst>
+            <a:ext uri="{909E8E84-426E-40DD-AFC4-6F175D3DCCD1}">
+              <a14:hiddenFill xmlns:a14="http://schemas.microsoft.com/office/drawing/2010/main">
+                <a:solidFill>
+                  <a:srgbClr val="FFFFFF"/>
+                </a:solidFill>
+              </a14:hiddenFill>
+            </a:ext>
+          </a:extLst>
+        </p:spPr>
+      </p:pic>
+      <p:sp>
+        <p:nvSpPr>
+          <p:cNvPr id="2" name="Title 1"/>
+          <p:cNvSpPr>
+            <a:spLocks noGrp="1"/>
+          </p:cNvSpPr>
+          <p:nvPr>
+            <p:ph type="title"/>
+          </p:nvPr>
+        </p:nvSpPr>
+        <p:spPr>
+          <a:xfrm>
+            <a:off x="677334" y="2144684"/>
+            <a:ext cx="10893982" cy="3486858"/>
+          </a:xfrm>
+        </p:spPr>
+        <p:txBody>
+          <a:bodyPr>
+            <a:noAutofit/>
+          </a:bodyPr>
+          <a:lstStyle/>
+          <a:p>
+            <a:pPr algn="ctr"/>
+            <a:r>
+              <a:rPr lang="en-GB" sz="17000" u="sng" dirty="0" smtClean="0">
+                <a:solidFill>
+                  <a:srgbClr val="0070C0"/>
+                </a:solidFill>
+              </a:rPr>
+              <a:t>The End!!!</a:t>
+            </a:r>
+            <a:endParaRPr lang="en-GB" sz="17000" u="sng" dirty="0">
+              <a:solidFill>
+                <a:srgbClr val="0070C0"/>
+              </a:solidFill>
+            </a:endParaRPr>
+          </a:p>
+        </p:txBody>
+      </p:sp>
+    </p:spTree>
+    <p:extLst>
+      <p:ext uri="{BB962C8B-B14F-4D97-AF65-F5344CB8AC3E}">
+        <p14:creationId xmlns:p14="http://schemas.microsoft.com/office/powerpoint/2010/main" val="4056443852"/>
+      </p:ext>
+    </p:extLst>
+  </p:cSld>
+  <p:clrMapOvr>
+    <a:masterClrMapping/>
+  </p:clrMapOvr>
+  <p:timing>
+    <p:tnLst>
+      <p:par>
+        <p:cTn id="1" dur="indefinite" restart="never" nodeType="tmRoot">
+          <p:childTnLst>
+            <p:seq concurrent="1" nextAc="seek">
+              <p:cTn id="2" dur="indefinite" nodeType="mainSeq">
+                <p:childTnLst>
+                  <p:par>
+                    <p:cTn id="3" fill="hold">
+                      <p:stCondLst>
+                        <p:cond delay="indefinite"/>
+                      </p:stCondLst>
+                      <p:childTnLst>
+                        <p:par>
+                          <p:cTn id="4" fill="hold">
+                            <p:stCondLst>
+                              <p:cond delay="0"/>
+                            </p:stCondLst>
+                            <p:childTnLst>
+                              <p:par>
+                                <p:cTn id="5" presetID="31" presetClass="entr" presetSubtype="0" fill="hold" grpId="0" nodeType="clickEffect">
+                                  <p:stCondLst>
+                                    <p:cond delay="0"/>
+                                  </p:stCondLst>
+                                  <p:childTnLst>
+                                    <p:set>
+                                      <p:cBhvr>
+                                        <p:cTn id="6" dur="1" fill="hold">
+                                          <p:stCondLst>
+                                            <p:cond delay="0"/>
+                                          </p:stCondLst>
+                                        </p:cTn>
+                                        <p:tgtEl>
+                                          <p:spTgt spid="2"/>
+                                        </p:tgtEl>
+                                        <p:attrNameLst>
+                                          <p:attrName>style.visibility</p:attrName>
+                                        </p:attrNameLst>
+                                      </p:cBhvr>
+                                      <p:to>
+                                        <p:strVal val="visible"/>
+                                      </p:to>
+                                    </p:set>
+                                    <p:anim calcmode="lin" valueType="num">
+                                      <p:cBhvr>
+                                        <p:cTn id="7" dur="1000" fill="hold"/>
+                                        <p:tgtEl>
+                                          <p:spTgt spid="2"/>
+                                        </p:tgtEl>
+                                        <p:attrNameLst>
+                                          <p:attrName>ppt_w</p:attrName>
+                                        </p:attrNameLst>
+                                      </p:cBhvr>
+                                      <p:tavLst>
+                                        <p:tav tm="0">
+                                          <p:val>
+                                            <p:fltVal val="0"/>
+                                          </p:val>
+                                        </p:tav>
+                                        <p:tav tm="100000">
+                                          <p:val>
+                                            <p:strVal val="#ppt_w"/>
+                                          </p:val>
+                                        </p:tav>
+                                      </p:tavLst>
+                                    </p:anim>
+                                    <p:anim calcmode="lin" valueType="num">
+                                      <p:cBhvr>
+                                        <p:cTn id="8" dur="1000" fill="hold"/>
+                                        <p:tgtEl>
+                                          <p:spTgt spid="2"/>
+                                        </p:tgtEl>
+                                        <p:attrNameLst>
+                                          <p:attrName>ppt_h</p:attrName>
+                                        </p:attrNameLst>
+                                      </p:cBhvr>
+                                      <p:tavLst>
+                                        <p:tav tm="0">
+                                          <p:val>
+                                            <p:fltVal val="0"/>
+                                          </p:val>
+                                        </p:tav>
+                                        <p:tav tm="100000">
+                                          <p:val>
+                                            <p:strVal val="#ppt_h"/>
+                                          </p:val>
+                                        </p:tav>
+                                      </p:tavLst>
+                                    </p:anim>
+                                    <p:anim calcmode="lin" valueType="num">
+                                      <p:cBhvr>
+                                        <p:cTn id="9" dur="1000" fill="hold"/>
+                                        <p:tgtEl>
+                                          <p:spTgt spid="2"/>
+                                        </p:tgtEl>
+                                        <p:attrNameLst>
+                                          <p:attrName>style.rotation</p:attrName>
+                                        </p:attrNameLst>
+                                      </p:cBhvr>
+                                      <p:tavLst>
+                                        <p:tav tm="0">
+                                          <p:val>
+                                            <p:fltVal val="90"/>
+                                          </p:val>
+                                        </p:tav>
+                                        <p:tav tm="100000">
+                                          <p:val>
+                                            <p:fltVal val="0"/>
+                                          </p:val>
+                                        </p:tav>
+                                      </p:tavLst>
+                                    </p:anim>
+                                    <p:animEffect transition="in" filter="fade">
+                                      <p:cBhvr>
+                                        <p:cTn id="10" dur="1000"/>
+                                        <p:tgtEl>
+                                          <p:spTgt spid="2"/>
+                                        </p:tgtEl>
+                                      </p:cBhvr>
+                                    </p:animEffect>
+                                  </p:childTnLst>
+                                </p:cTn>
+                              </p:par>
+                            </p:childTnLst>
+                          </p:cTn>
+                        </p:par>
+                      </p:childTnLst>
+                    </p:cTn>
+                  </p:par>
+                </p:childTnLst>
+              </p:cTn>
+              <p:prevCondLst>
+                <p:cond evt="onPrev" delay="0">
+                  <p:tgtEl>
+                    <p:sldTgt/>
+                  </p:tgtEl>
+                </p:cond>
+              </p:prevCondLst>
+              <p:nextCondLst>
+                <p:cond evt="onNext" delay="0">
+                  <p:tgtEl>
+                    <p:sldTgt/>
+                  </p:tgtEl>
+                </p:cond>
+              </p:nextCondLst>
+            </p:seq>
+          </p:childTnLst>
+        </p:cTn>
+      </p:par>
+    </p:tnLst>
+    <p:bldLst>
+      <p:bldP spid="2" grpId="0"/>
     </p:bldLst>
   </p:timing>
 </p:sld>
@@ -13688,7 +13963,7 @@
           <a:p>
             <a:r>
               <a:rPr lang="en-GB" sz="2600" dirty="0" smtClean="0"/>
-              <a:t>Sentinel 1 is a Satellite which got launched April 3</a:t>
+              <a:t>Sentinel 1 is a Satellite which was launched April 3</a:t>
             </a:r>
             <a:r>
               <a:rPr lang="en-GB" sz="2600" baseline="30000" dirty="0" smtClean="0"/>
@@ -13696,28 +13971,26 @@
             </a:r>
             <a:r>
               <a:rPr lang="en-GB" sz="2600" dirty="0" smtClean="0"/>
-              <a:t> </a:t>
+              <a:t> 2014</a:t>
             </a:r>
             <a:r>
               <a:rPr lang="en-GB" sz="2600" dirty="0" smtClean="0"/>
-              <a:t>2014.</a:t>
+              <a:t>.</a:t>
             </a:r>
-            <a:endParaRPr lang="en-GB" sz="2600" dirty="0"/>
+            <a:endParaRPr lang="en-GB" sz="2400" dirty="0" smtClean="0"/>
           </a:p>
           <a:p>
             <a:r>
               <a:rPr lang="en-GB" sz="2600" dirty="0" smtClean="0"/>
-              <a:t>It’s power is 5.9</a:t>
+              <a:t>It’s launch mass </a:t>
             </a:r>
             <a:r>
-              <a:rPr lang="en-GB" sz="2400" dirty="0" smtClean="0"/>
-              <a:t>kW.</a:t>
+              <a:rPr lang="en-GB" sz="2600" dirty="0" smtClean="0"/>
+              <a:t>is </a:t>
             </a:r>
-          </a:p>
-          <a:p>
             <a:r>
               <a:rPr lang="en-GB" sz="2600" dirty="0" smtClean="0"/>
-              <a:t>It’s launch mass I 2,300</a:t>
+              <a:t>2,300</a:t>
             </a:r>
             <a:r>
               <a:rPr lang="en-GB" sz="2400" dirty="0" smtClean="0"/>
@@ -13725,37 +13998,24 @@
             </a:r>
             <a:r>
               <a:rPr lang="en-GB" sz="2000" dirty="0" smtClean="0"/>
-              <a:t>kg.</a:t>
+              <a:t>kg </a:t>
+            </a:r>
+            <a:r>
+              <a:rPr lang="en-GB" sz="2400" dirty="0" smtClean="0"/>
+              <a:t>(kilograms).</a:t>
+            </a:r>
+            <a:endParaRPr lang="en-GB" sz="2600" dirty="0" smtClean="0"/>
+          </a:p>
+          <a:p>
+            <a:r>
+              <a:rPr lang="en-GB" sz="2600" dirty="0" smtClean="0"/>
+              <a:t>Sentinel-1A launched first followed by 1B.</a:t>
             </a:r>
           </a:p>
           <a:p>
             <a:r>
               <a:rPr lang="en-GB" sz="2600" dirty="0" smtClean="0"/>
-              <a:t>It’s start date wa</a:t>
-            </a:r>
-            <a:r>
-              <a:rPr lang="en-GB" sz="2600" dirty="0" smtClean="0"/>
-              <a:t>s the same as when it got launched. (April 3</a:t>
-            </a:r>
-            <a:r>
-              <a:rPr lang="en-GB" sz="2600" baseline="30000" dirty="0" smtClean="0"/>
-              <a:t>rd</a:t>
-            </a:r>
-            <a:r>
-              <a:rPr lang="en-GB" sz="2600" dirty="0" smtClean="0"/>
-              <a:t> 2014)</a:t>
-            </a:r>
-          </a:p>
-          <a:p>
-            <a:r>
-              <a:rPr lang="en-GB" sz="2600" dirty="0" smtClean="0"/>
-              <a:t>It’s first launch of Sentinel-1A;</a:t>
-            </a:r>
-          </a:p>
-          <a:p>
-            <a:r>
-              <a:rPr lang="en-GB" sz="2600" dirty="0" smtClean="0"/>
-              <a:t>It launched twice.</a:t>
+              <a:t>It measures land/surface height using radar.</a:t>
             </a:r>
             <a:endParaRPr lang="en-GB" sz="2600" dirty="0"/>
           </a:p>
@@ -15269,7 +15529,7 @@
                             </p:stCondLst>
                             <p:childTnLst>
                               <p:par>
-                                <p:cTn id="82" presetID="26" presetClass="entr" presetSubtype="0" fill="hold" grpId="0" nodeType="clickEffect">
+                                <p:cTn id="82" presetID="53" presetClass="entr" presetSubtype="16" fill="hold" nodeType="clickEffect">
                                   <p:stCondLst>
                                     <p:cond delay="0"/>
                                   </p:stCondLst>
@@ -15282,718 +15542,6 @@
                                           </p:stCondLst>
                                         </p:cTn>
                                         <p:tgtEl>
-                                          <p:spTgt spid="3">
-                                            <p:txEl>
-                                              <p:pRg st="4" end="4"/>
-                                            </p:txEl>
-                                          </p:spTgt>
-                                        </p:tgtEl>
-                                        <p:attrNameLst>
-                                          <p:attrName>style.visibility</p:attrName>
-                                        </p:attrNameLst>
-                                      </p:cBhvr>
-                                      <p:to>
-                                        <p:strVal val="visible"/>
-                                      </p:to>
-                                    </p:set>
-                                    <p:animEffect transition="in" filter="wipe(down)">
-                                      <p:cBhvr>
-                                        <p:cTn id="84" dur="580">
-                                          <p:stCondLst>
-                                            <p:cond delay="0"/>
-                                          </p:stCondLst>
-                                        </p:cTn>
-                                        <p:tgtEl>
-                                          <p:spTgt spid="3">
-                                            <p:txEl>
-                                              <p:pRg st="4" end="4"/>
-                                            </p:txEl>
-                                          </p:spTgt>
-                                        </p:tgtEl>
-                                      </p:cBhvr>
-                                    </p:animEffect>
-                                    <p:anim calcmode="lin" valueType="num">
-                                      <p:cBhvr>
-                                        <p:cTn id="85" dur="1822" tmFilter="0,0; 0.14,0.36; 0.43,0.73; 0.71,0.91; 1.0,1.0">
-                                          <p:stCondLst>
-                                            <p:cond delay="0"/>
-                                          </p:stCondLst>
-                                        </p:cTn>
-                                        <p:tgtEl>
-                                          <p:spTgt spid="3">
-                                            <p:txEl>
-                                              <p:pRg st="4" end="4"/>
-                                            </p:txEl>
-                                          </p:spTgt>
-                                        </p:tgtEl>
-                                        <p:attrNameLst>
-                                          <p:attrName>ppt_x</p:attrName>
-                                        </p:attrNameLst>
-                                      </p:cBhvr>
-                                      <p:tavLst>
-                                        <p:tav tm="0">
-                                          <p:val>
-                                            <p:strVal val="#ppt_x-0.25"/>
-                                          </p:val>
-                                        </p:tav>
-                                        <p:tav tm="100000">
-                                          <p:val>
-                                            <p:strVal val="#ppt_x"/>
-                                          </p:val>
-                                        </p:tav>
-                                      </p:tavLst>
-                                    </p:anim>
-                                    <p:anim calcmode="lin" valueType="num">
-                                      <p:cBhvr>
-                                        <p:cTn id="86" dur="664" tmFilter="0.0,0.0; 0.25,0.07; 0.50,0.2; 0.75,0.467; 1.0,1.0">
-                                          <p:stCondLst>
-                                            <p:cond delay="0"/>
-                                          </p:stCondLst>
-                                        </p:cTn>
-                                        <p:tgtEl>
-                                          <p:spTgt spid="3">
-                                            <p:txEl>
-                                              <p:pRg st="4" end="4"/>
-                                            </p:txEl>
-                                          </p:spTgt>
-                                        </p:tgtEl>
-                                        <p:attrNameLst>
-                                          <p:attrName>ppt_y</p:attrName>
-                                        </p:attrNameLst>
-                                      </p:cBhvr>
-                                      <p:tavLst>
-                                        <p:tav tm="0" fmla="#ppt_y-sin(pi*$)/3">
-                                          <p:val>
-                                            <p:fltVal val="0.5"/>
-                                          </p:val>
-                                        </p:tav>
-                                        <p:tav tm="100000">
-                                          <p:val>
-                                            <p:fltVal val="1"/>
-                                          </p:val>
-                                        </p:tav>
-                                      </p:tavLst>
-                                    </p:anim>
-                                    <p:anim calcmode="lin" valueType="num">
-                                      <p:cBhvr>
-                                        <p:cTn id="87" dur="664" tmFilter="0, 0; 0.125,0.2665; 0.25,0.4; 0.375,0.465; 0.5,0.5;  0.625,0.535; 0.75,0.6; 0.875,0.7335; 1,1">
-                                          <p:stCondLst>
-                                            <p:cond delay="664"/>
-                                          </p:stCondLst>
-                                        </p:cTn>
-                                        <p:tgtEl>
-                                          <p:spTgt spid="3">
-                                            <p:txEl>
-                                              <p:pRg st="4" end="4"/>
-                                            </p:txEl>
-                                          </p:spTgt>
-                                        </p:tgtEl>
-                                        <p:attrNameLst>
-                                          <p:attrName>ppt_y</p:attrName>
-                                        </p:attrNameLst>
-                                      </p:cBhvr>
-                                      <p:tavLst>
-                                        <p:tav tm="0" fmla="#ppt_y-sin(pi*$)/9">
-                                          <p:val>
-                                            <p:fltVal val="0"/>
-                                          </p:val>
-                                        </p:tav>
-                                        <p:tav tm="100000">
-                                          <p:val>
-                                            <p:fltVal val="1"/>
-                                          </p:val>
-                                        </p:tav>
-                                      </p:tavLst>
-                                    </p:anim>
-                                    <p:anim calcmode="lin" valueType="num">
-                                      <p:cBhvr>
-                                        <p:cTn id="88" dur="332" tmFilter="0, 0; 0.125,0.2665; 0.25,0.4; 0.375,0.465; 0.5,0.5;  0.625,0.535; 0.75,0.6; 0.875,0.7335; 1,1">
-                                          <p:stCondLst>
-                                            <p:cond delay="1324"/>
-                                          </p:stCondLst>
-                                        </p:cTn>
-                                        <p:tgtEl>
-                                          <p:spTgt spid="3">
-                                            <p:txEl>
-                                              <p:pRg st="4" end="4"/>
-                                            </p:txEl>
-                                          </p:spTgt>
-                                        </p:tgtEl>
-                                        <p:attrNameLst>
-                                          <p:attrName>ppt_y</p:attrName>
-                                        </p:attrNameLst>
-                                      </p:cBhvr>
-                                      <p:tavLst>
-                                        <p:tav tm="0" fmla="#ppt_y-sin(pi*$)/27">
-                                          <p:val>
-                                            <p:fltVal val="0"/>
-                                          </p:val>
-                                        </p:tav>
-                                        <p:tav tm="100000">
-                                          <p:val>
-                                            <p:fltVal val="1"/>
-                                          </p:val>
-                                        </p:tav>
-                                      </p:tavLst>
-                                    </p:anim>
-                                    <p:anim calcmode="lin" valueType="num">
-                                      <p:cBhvr>
-                                        <p:cTn id="89" dur="164" tmFilter="0, 0; 0.125,0.2665; 0.25,0.4; 0.375,0.465; 0.5,0.5;  0.625,0.535; 0.75,0.6; 0.875,0.7335; 1,1">
-                                          <p:stCondLst>
-                                            <p:cond delay="1656"/>
-                                          </p:stCondLst>
-                                        </p:cTn>
-                                        <p:tgtEl>
-                                          <p:spTgt spid="3">
-                                            <p:txEl>
-                                              <p:pRg st="4" end="4"/>
-                                            </p:txEl>
-                                          </p:spTgt>
-                                        </p:tgtEl>
-                                        <p:attrNameLst>
-                                          <p:attrName>ppt_y</p:attrName>
-                                        </p:attrNameLst>
-                                      </p:cBhvr>
-                                      <p:tavLst>
-                                        <p:tav tm="0" fmla="#ppt_y-sin(pi*$)/81">
-                                          <p:val>
-                                            <p:fltVal val="0"/>
-                                          </p:val>
-                                        </p:tav>
-                                        <p:tav tm="100000">
-                                          <p:val>
-                                            <p:fltVal val="1"/>
-                                          </p:val>
-                                        </p:tav>
-                                      </p:tavLst>
-                                    </p:anim>
-                                    <p:animScale>
-                                      <p:cBhvr>
-                                        <p:cTn id="90" dur="26">
-                                          <p:stCondLst>
-                                            <p:cond delay="650"/>
-                                          </p:stCondLst>
-                                        </p:cTn>
-                                        <p:tgtEl>
-                                          <p:spTgt spid="3">
-                                            <p:txEl>
-                                              <p:pRg st="4" end="4"/>
-                                            </p:txEl>
-                                          </p:spTgt>
-                                        </p:tgtEl>
-                                      </p:cBhvr>
-                                      <p:to x="100000" y="60000"/>
-                                    </p:animScale>
-                                    <p:animScale>
-                                      <p:cBhvr>
-                                        <p:cTn id="91" dur="166" decel="50000">
-                                          <p:stCondLst>
-                                            <p:cond delay="676"/>
-                                          </p:stCondLst>
-                                        </p:cTn>
-                                        <p:tgtEl>
-                                          <p:spTgt spid="3">
-                                            <p:txEl>
-                                              <p:pRg st="4" end="4"/>
-                                            </p:txEl>
-                                          </p:spTgt>
-                                        </p:tgtEl>
-                                      </p:cBhvr>
-                                      <p:to x="100000" y="100000"/>
-                                    </p:animScale>
-                                    <p:animScale>
-                                      <p:cBhvr>
-                                        <p:cTn id="92" dur="26">
-                                          <p:stCondLst>
-                                            <p:cond delay="1312"/>
-                                          </p:stCondLst>
-                                        </p:cTn>
-                                        <p:tgtEl>
-                                          <p:spTgt spid="3">
-                                            <p:txEl>
-                                              <p:pRg st="4" end="4"/>
-                                            </p:txEl>
-                                          </p:spTgt>
-                                        </p:tgtEl>
-                                      </p:cBhvr>
-                                      <p:to x="100000" y="80000"/>
-                                    </p:animScale>
-                                    <p:animScale>
-                                      <p:cBhvr>
-                                        <p:cTn id="93" dur="166" decel="50000">
-                                          <p:stCondLst>
-                                            <p:cond delay="1338"/>
-                                          </p:stCondLst>
-                                        </p:cTn>
-                                        <p:tgtEl>
-                                          <p:spTgt spid="3">
-                                            <p:txEl>
-                                              <p:pRg st="4" end="4"/>
-                                            </p:txEl>
-                                          </p:spTgt>
-                                        </p:tgtEl>
-                                      </p:cBhvr>
-                                      <p:to x="100000" y="100000"/>
-                                    </p:animScale>
-                                    <p:animScale>
-                                      <p:cBhvr>
-                                        <p:cTn id="94" dur="26">
-                                          <p:stCondLst>
-                                            <p:cond delay="1642"/>
-                                          </p:stCondLst>
-                                        </p:cTn>
-                                        <p:tgtEl>
-                                          <p:spTgt spid="3">
-                                            <p:txEl>
-                                              <p:pRg st="4" end="4"/>
-                                            </p:txEl>
-                                          </p:spTgt>
-                                        </p:tgtEl>
-                                      </p:cBhvr>
-                                      <p:to x="100000" y="90000"/>
-                                    </p:animScale>
-                                    <p:animScale>
-                                      <p:cBhvr>
-                                        <p:cTn id="95" dur="166" decel="50000">
-                                          <p:stCondLst>
-                                            <p:cond delay="1668"/>
-                                          </p:stCondLst>
-                                        </p:cTn>
-                                        <p:tgtEl>
-                                          <p:spTgt spid="3">
-                                            <p:txEl>
-                                              <p:pRg st="4" end="4"/>
-                                            </p:txEl>
-                                          </p:spTgt>
-                                        </p:tgtEl>
-                                      </p:cBhvr>
-                                      <p:to x="100000" y="100000"/>
-                                    </p:animScale>
-                                    <p:animScale>
-                                      <p:cBhvr>
-                                        <p:cTn id="96" dur="26">
-                                          <p:stCondLst>
-                                            <p:cond delay="1808"/>
-                                          </p:stCondLst>
-                                        </p:cTn>
-                                        <p:tgtEl>
-                                          <p:spTgt spid="3">
-                                            <p:txEl>
-                                              <p:pRg st="4" end="4"/>
-                                            </p:txEl>
-                                          </p:spTgt>
-                                        </p:tgtEl>
-                                      </p:cBhvr>
-                                      <p:to x="100000" y="95000"/>
-                                    </p:animScale>
-                                    <p:animScale>
-                                      <p:cBhvr>
-                                        <p:cTn id="97" dur="166" decel="50000">
-                                          <p:stCondLst>
-                                            <p:cond delay="1834"/>
-                                          </p:stCondLst>
-                                        </p:cTn>
-                                        <p:tgtEl>
-                                          <p:spTgt spid="3">
-                                            <p:txEl>
-                                              <p:pRg st="4" end="4"/>
-                                            </p:txEl>
-                                          </p:spTgt>
-                                        </p:tgtEl>
-                                      </p:cBhvr>
-                                      <p:to x="100000" y="100000"/>
-                                    </p:animScale>
-                                  </p:childTnLst>
-                                </p:cTn>
-                              </p:par>
-                            </p:childTnLst>
-                          </p:cTn>
-                        </p:par>
-                      </p:childTnLst>
-                    </p:cTn>
-                  </p:par>
-                  <p:par>
-                    <p:cTn id="98" fill="hold">
-                      <p:stCondLst>
-                        <p:cond delay="indefinite"/>
-                      </p:stCondLst>
-                      <p:childTnLst>
-                        <p:par>
-                          <p:cTn id="99" fill="hold">
-                            <p:stCondLst>
-                              <p:cond delay="0"/>
-                            </p:stCondLst>
-                            <p:childTnLst>
-                              <p:par>
-                                <p:cTn id="100" presetID="26" presetClass="entr" presetSubtype="0" fill="hold" grpId="0" nodeType="clickEffect">
-                                  <p:stCondLst>
-                                    <p:cond delay="0"/>
-                                  </p:stCondLst>
-                                  <p:childTnLst>
-                                    <p:set>
-                                      <p:cBhvr>
-                                        <p:cTn id="101" dur="1" fill="hold">
-                                          <p:stCondLst>
-                                            <p:cond delay="0"/>
-                                          </p:stCondLst>
-                                        </p:cTn>
-                                        <p:tgtEl>
-                                          <p:spTgt spid="3">
-                                            <p:txEl>
-                                              <p:pRg st="5" end="5"/>
-                                            </p:txEl>
-                                          </p:spTgt>
-                                        </p:tgtEl>
-                                        <p:attrNameLst>
-                                          <p:attrName>style.visibility</p:attrName>
-                                        </p:attrNameLst>
-                                      </p:cBhvr>
-                                      <p:to>
-                                        <p:strVal val="visible"/>
-                                      </p:to>
-                                    </p:set>
-                                    <p:animEffect transition="in" filter="wipe(down)">
-                                      <p:cBhvr>
-                                        <p:cTn id="102" dur="580">
-                                          <p:stCondLst>
-                                            <p:cond delay="0"/>
-                                          </p:stCondLst>
-                                        </p:cTn>
-                                        <p:tgtEl>
-                                          <p:spTgt spid="3">
-                                            <p:txEl>
-                                              <p:pRg st="5" end="5"/>
-                                            </p:txEl>
-                                          </p:spTgt>
-                                        </p:tgtEl>
-                                      </p:cBhvr>
-                                    </p:animEffect>
-                                    <p:anim calcmode="lin" valueType="num">
-                                      <p:cBhvr>
-                                        <p:cTn id="103" dur="1822" tmFilter="0,0; 0.14,0.36; 0.43,0.73; 0.71,0.91; 1.0,1.0">
-                                          <p:stCondLst>
-                                            <p:cond delay="0"/>
-                                          </p:stCondLst>
-                                        </p:cTn>
-                                        <p:tgtEl>
-                                          <p:spTgt spid="3">
-                                            <p:txEl>
-                                              <p:pRg st="5" end="5"/>
-                                            </p:txEl>
-                                          </p:spTgt>
-                                        </p:tgtEl>
-                                        <p:attrNameLst>
-                                          <p:attrName>ppt_x</p:attrName>
-                                        </p:attrNameLst>
-                                      </p:cBhvr>
-                                      <p:tavLst>
-                                        <p:tav tm="0">
-                                          <p:val>
-                                            <p:strVal val="#ppt_x-0.25"/>
-                                          </p:val>
-                                        </p:tav>
-                                        <p:tav tm="100000">
-                                          <p:val>
-                                            <p:strVal val="#ppt_x"/>
-                                          </p:val>
-                                        </p:tav>
-                                      </p:tavLst>
-                                    </p:anim>
-                                    <p:anim calcmode="lin" valueType="num">
-                                      <p:cBhvr>
-                                        <p:cTn id="104" dur="664" tmFilter="0.0,0.0; 0.25,0.07; 0.50,0.2; 0.75,0.467; 1.0,1.0">
-                                          <p:stCondLst>
-                                            <p:cond delay="0"/>
-                                          </p:stCondLst>
-                                        </p:cTn>
-                                        <p:tgtEl>
-                                          <p:spTgt spid="3">
-                                            <p:txEl>
-                                              <p:pRg st="5" end="5"/>
-                                            </p:txEl>
-                                          </p:spTgt>
-                                        </p:tgtEl>
-                                        <p:attrNameLst>
-                                          <p:attrName>ppt_y</p:attrName>
-                                        </p:attrNameLst>
-                                      </p:cBhvr>
-                                      <p:tavLst>
-                                        <p:tav tm="0" fmla="#ppt_y-sin(pi*$)/3">
-                                          <p:val>
-                                            <p:fltVal val="0.5"/>
-                                          </p:val>
-                                        </p:tav>
-                                        <p:tav tm="100000">
-                                          <p:val>
-                                            <p:fltVal val="1"/>
-                                          </p:val>
-                                        </p:tav>
-                                      </p:tavLst>
-                                    </p:anim>
-                                    <p:anim calcmode="lin" valueType="num">
-                                      <p:cBhvr>
-                                        <p:cTn id="105" dur="664" tmFilter="0, 0; 0.125,0.2665; 0.25,0.4; 0.375,0.465; 0.5,0.5;  0.625,0.535; 0.75,0.6; 0.875,0.7335; 1,1">
-                                          <p:stCondLst>
-                                            <p:cond delay="664"/>
-                                          </p:stCondLst>
-                                        </p:cTn>
-                                        <p:tgtEl>
-                                          <p:spTgt spid="3">
-                                            <p:txEl>
-                                              <p:pRg st="5" end="5"/>
-                                            </p:txEl>
-                                          </p:spTgt>
-                                        </p:tgtEl>
-                                        <p:attrNameLst>
-                                          <p:attrName>ppt_y</p:attrName>
-                                        </p:attrNameLst>
-                                      </p:cBhvr>
-                                      <p:tavLst>
-                                        <p:tav tm="0" fmla="#ppt_y-sin(pi*$)/9">
-                                          <p:val>
-                                            <p:fltVal val="0"/>
-                                          </p:val>
-                                        </p:tav>
-                                        <p:tav tm="100000">
-                                          <p:val>
-                                            <p:fltVal val="1"/>
-                                          </p:val>
-                                        </p:tav>
-                                      </p:tavLst>
-                                    </p:anim>
-                                    <p:anim calcmode="lin" valueType="num">
-                                      <p:cBhvr>
-                                        <p:cTn id="106" dur="332" tmFilter="0, 0; 0.125,0.2665; 0.25,0.4; 0.375,0.465; 0.5,0.5;  0.625,0.535; 0.75,0.6; 0.875,0.7335; 1,1">
-                                          <p:stCondLst>
-                                            <p:cond delay="1324"/>
-                                          </p:stCondLst>
-                                        </p:cTn>
-                                        <p:tgtEl>
-                                          <p:spTgt spid="3">
-                                            <p:txEl>
-                                              <p:pRg st="5" end="5"/>
-                                            </p:txEl>
-                                          </p:spTgt>
-                                        </p:tgtEl>
-                                        <p:attrNameLst>
-                                          <p:attrName>ppt_y</p:attrName>
-                                        </p:attrNameLst>
-                                      </p:cBhvr>
-                                      <p:tavLst>
-                                        <p:tav tm="0" fmla="#ppt_y-sin(pi*$)/27">
-                                          <p:val>
-                                            <p:fltVal val="0"/>
-                                          </p:val>
-                                        </p:tav>
-                                        <p:tav tm="100000">
-                                          <p:val>
-                                            <p:fltVal val="1"/>
-                                          </p:val>
-                                        </p:tav>
-                                      </p:tavLst>
-                                    </p:anim>
-                                    <p:anim calcmode="lin" valueType="num">
-                                      <p:cBhvr>
-                                        <p:cTn id="107" dur="164" tmFilter="0, 0; 0.125,0.2665; 0.25,0.4; 0.375,0.465; 0.5,0.5;  0.625,0.535; 0.75,0.6; 0.875,0.7335; 1,1">
-                                          <p:stCondLst>
-                                            <p:cond delay="1656"/>
-                                          </p:stCondLst>
-                                        </p:cTn>
-                                        <p:tgtEl>
-                                          <p:spTgt spid="3">
-                                            <p:txEl>
-                                              <p:pRg st="5" end="5"/>
-                                            </p:txEl>
-                                          </p:spTgt>
-                                        </p:tgtEl>
-                                        <p:attrNameLst>
-                                          <p:attrName>ppt_y</p:attrName>
-                                        </p:attrNameLst>
-                                      </p:cBhvr>
-                                      <p:tavLst>
-                                        <p:tav tm="0" fmla="#ppt_y-sin(pi*$)/81">
-                                          <p:val>
-                                            <p:fltVal val="0"/>
-                                          </p:val>
-                                        </p:tav>
-                                        <p:tav tm="100000">
-                                          <p:val>
-                                            <p:fltVal val="1"/>
-                                          </p:val>
-                                        </p:tav>
-                                      </p:tavLst>
-                                    </p:anim>
-                                    <p:animScale>
-                                      <p:cBhvr>
-                                        <p:cTn id="108" dur="26">
-                                          <p:stCondLst>
-                                            <p:cond delay="650"/>
-                                          </p:stCondLst>
-                                        </p:cTn>
-                                        <p:tgtEl>
-                                          <p:spTgt spid="3">
-                                            <p:txEl>
-                                              <p:pRg st="5" end="5"/>
-                                            </p:txEl>
-                                          </p:spTgt>
-                                        </p:tgtEl>
-                                      </p:cBhvr>
-                                      <p:to x="100000" y="60000"/>
-                                    </p:animScale>
-                                    <p:animScale>
-                                      <p:cBhvr>
-                                        <p:cTn id="109" dur="166" decel="50000">
-                                          <p:stCondLst>
-                                            <p:cond delay="676"/>
-                                          </p:stCondLst>
-                                        </p:cTn>
-                                        <p:tgtEl>
-                                          <p:spTgt spid="3">
-                                            <p:txEl>
-                                              <p:pRg st="5" end="5"/>
-                                            </p:txEl>
-                                          </p:spTgt>
-                                        </p:tgtEl>
-                                      </p:cBhvr>
-                                      <p:to x="100000" y="100000"/>
-                                    </p:animScale>
-                                    <p:animScale>
-                                      <p:cBhvr>
-                                        <p:cTn id="110" dur="26">
-                                          <p:stCondLst>
-                                            <p:cond delay="1312"/>
-                                          </p:stCondLst>
-                                        </p:cTn>
-                                        <p:tgtEl>
-                                          <p:spTgt spid="3">
-                                            <p:txEl>
-                                              <p:pRg st="5" end="5"/>
-                                            </p:txEl>
-                                          </p:spTgt>
-                                        </p:tgtEl>
-                                      </p:cBhvr>
-                                      <p:to x="100000" y="80000"/>
-                                    </p:animScale>
-                                    <p:animScale>
-                                      <p:cBhvr>
-                                        <p:cTn id="111" dur="166" decel="50000">
-                                          <p:stCondLst>
-                                            <p:cond delay="1338"/>
-                                          </p:stCondLst>
-                                        </p:cTn>
-                                        <p:tgtEl>
-                                          <p:spTgt spid="3">
-                                            <p:txEl>
-                                              <p:pRg st="5" end="5"/>
-                                            </p:txEl>
-                                          </p:spTgt>
-                                        </p:tgtEl>
-                                      </p:cBhvr>
-                                      <p:to x="100000" y="100000"/>
-                                    </p:animScale>
-                                    <p:animScale>
-                                      <p:cBhvr>
-                                        <p:cTn id="112" dur="26">
-                                          <p:stCondLst>
-                                            <p:cond delay="1642"/>
-                                          </p:stCondLst>
-                                        </p:cTn>
-                                        <p:tgtEl>
-                                          <p:spTgt spid="3">
-                                            <p:txEl>
-                                              <p:pRg st="5" end="5"/>
-                                            </p:txEl>
-                                          </p:spTgt>
-                                        </p:tgtEl>
-                                      </p:cBhvr>
-                                      <p:to x="100000" y="90000"/>
-                                    </p:animScale>
-                                    <p:animScale>
-                                      <p:cBhvr>
-                                        <p:cTn id="113" dur="166" decel="50000">
-                                          <p:stCondLst>
-                                            <p:cond delay="1668"/>
-                                          </p:stCondLst>
-                                        </p:cTn>
-                                        <p:tgtEl>
-                                          <p:spTgt spid="3">
-                                            <p:txEl>
-                                              <p:pRg st="5" end="5"/>
-                                            </p:txEl>
-                                          </p:spTgt>
-                                        </p:tgtEl>
-                                      </p:cBhvr>
-                                      <p:to x="100000" y="100000"/>
-                                    </p:animScale>
-                                    <p:animScale>
-                                      <p:cBhvr>
-                                        <p:cTn id="114" dur="26">
-                                          <p:stCondLst>
-                                            <p:cond delay="1808"/>
-                                          </p:stCondLst>
-                                        </p:cTn>
-                                        <p:tgtEl>
-                                          <p:spTgt spid="3">
-                                            <p:txEl>
-                                              <p:pRg st="5" end="5"/>
-                                            </p:txEl>
-                                          </p:spTgt>
-                                        </p:tgtEl>
-                                      </p:cBhvr>
-                                      <p:to x="100000" y="95000"/>
-                                    </p:animScale>
-                                    <p:animScale>
-                                      <p:cBhvr>
-                                        <p:cTn id="115" dur="166" decel="50000">
-                                          <p:stCondLst>
-                                            <p:cond delay="1834"/>
-                                          </p:stCondLst>
-                                        </p:cTn>
-                                        <p:tgtEl>
-                                          <p:spTgt spid="3">
-                                            <p:txEl>
-                                              <p:pRg st="5" end="5"/>
-                                            </p:txEl>
-                                          </p:spTgt>
-                                        </p:tgtEl>
-                                      </p:cBhvr>
-                                      <p:to x="100000" y="100000"/>
-                                    </p:animScale>
-                                  </p:childTnLst>
-                                </p:cTn>
-                              </p:par>
-                            </p:childTnLst>
-                          </p:cTn>
-                        </p:par>
-                      </p:childTnLst>
-                    </p:cTn>
-                  </p:par>
-                  <p:par>
-                    <p:cTn id="116" fill="hold">
-                      <p:stCondLst>
-                        <p:cond delay="indefinite"/>
-                      </p:stCondLst>
-                      <p:childTnLst>
-                        <p:par>
-                          <p:cTn id="117" fill="hold">
-                            <p:stCondLst>
-                              <p:cond delay="0"/>
-                            </p:stCondLst>
-                            <p:childTnLst>
-                              <p:par>
-                                <p:cTn id="118" presetID="53" presetClass="entr" presetSubtype="16" fill="hold" nodeType="clickEffect">
-                                  <p:stCondLst>
-                                    <p:cond delay="0"/>
-                                  </p:stCondLst>
-                                  <p:childTnLst>
-                                    <p:set>
-                                      <p:cBhvr>
-                                        <p:cTn id="119" dur="1" fill="hold">
-                                          <p:stCondLst>
-                                            <p:cond delay="0"/>
-                                          </p:stCondLst>
-                                        </p:cTn>
-                                        <p:tgtEl>
                                           <p:spTgt spid="4108"/>
                                         </p:tgtEl>
                                         <p:attrNameLst>
@@ -16006,7 +15554,7 @@
                                     </p:set>
                                     <p:anim calcmode="lin" valueType="num">
                                       <p:cBhvr>
-                                        <p:cTn id="120" dur="500" fill="hold"/>
+                                        <p:cTn id="84" dur="500" fill="hold"/>
                                         <p:tgtEl>
                                           <p:spTgt spid="4108"/>
                                         </p:tgtEl>
@@ -16029,7 +15577,7 @@
                                     </p:anim>
                                     <p:anim calcmode="lin" valueType="num">
                                       <p:cBhvr>
-                                        <p:cTn id="121" dur="500" fill="hold"/>
+                                        <p:cTn id="85" dur="500" fill="hold"/>
                                         <p:tgtEl>
                                           <p:spTgt spid="4108"/>
                                         </p:tgtEl>
@@ -16052,7 +15600,7 @@
                                     </p:anim>
                                     <p:animEffect transition="in" filter="fade">
                                       <p:cBhvr>
-                                        <p:cTn id="122" dur="500"/>
+                                        <p:cTn id="86" dur="500"/>
                                         <p:tgtEl>
                                           <p:spTgt spid="4108"/>
                                         </p:tgtEl>
@@ -16097,6 +15645,883 @@
 </file>
 
 <file path=ppt/slides/slide6.xml><?xml version="1.0" encoding="utf-8"?>
+<p:sld xmlns:a="http://schemas.openxmlformats.org/drawingml/2006/main" xmlns:r="http://schemas.openxmlformats.org/officeDocument/2006/relationships" xmlns:p="http://schemas.openxmlformats.org/presentationml/2006/main">
+  <p:cSld>
+    <p:spTree>
+      <p:nvGrpSpPr>
+        <p:cNvPr id="1" name=""/>
+        <p:cNvGrpSpPr/>
+        <p:nvPr/>
+      </p:nvGrpSpPr>
+      <p:grpSpPr>
+        <a:xfrm>
+          <a:off x="0" y="0"/>
+          <a:ext cx="0" cy="0"/>
+          <a:chOff x="0" y="0"/>
+          <a:chExt cx="0" cy="0"/>
+        </a:xfrm>
+      </p:grpSpPr>
+      <p:sp>
+        <p:nvSpPr>
+          <p:cNvPr id="2" name="Title 1"/>
+          <p:cNvSpPr>
+            <a:spLocks noGrp="1"/>
+          </p:cNvSpPr>
+          <p:nvPr>
+            <p:ph type="title"/>
+          </p:nvPr>
+        </p:nvSpPr>
+        <p:spPr/>
+        <p:txBody>
+          <a:bodyPr/>
+          <a:lstStyle/>
+          <a:p>
+            <a:r>
+              <a:rPr lang="en-GB" dirty="0" smtClean="0"/>
+              <a:t>Why use radar?</a:t>
+            </a:r>
+            <a:endParaRPr lang="en-GB" dirty="0"/>
+          </a:p>
+        </p:txBody>
+      </p:sp>
+      <p:sp>
+        <p:nvSpPr>
+          <p:cNvPr id="3" name="Content Placeholder 2"/>
+          <p:cNvSpPr>
+            <a:spLocks noGrp="1"/>
+          </p:cNvSpPr>
+          <p:nvPr>
+            <p:ph idx="1"/>
+          </p:nvPr>
+        </p:nvSpPr>
+        <p:spPr>
+          <a:xfrm>
+            <a:off x="677334" y="1270000"/>
+            <a:ext cx="8596668" cy="1920756"/>
+          </a:xfrm>
+        </p:spPr>
+        <p:txBody>
+          <a:bodyPr>
+            <a:normAutofit fontScale="92500" lnSpcReduction="10000"/>
+          </a:bodyPr>
+          <a:lstStyle/>
+          <a:p>
+            <a:endParaRPr lang="en-GB" dirty="0"/>
+          </a:p>
+          <a:p>
+            <a:r>
+              <a:rPr lang="en-GB" sz="2600" dirty="0" smtClean="0"/>
+              <a:t>Synthetic Aperture Radar (SAR) has the advantage of operating at wavelengths not </a:t>
+            </a:r>
+            <a:r>
+              <a:rPr lang="en-GB" sz="2600" dirty="0" smtClean="0"/>
+              <a:t>stopped </a:t>
+            </a:r>
+            <a:r>
+              <a:rPr lang="en-GB" sz="2600" dirty="0" smtClean="0"/>
+              <a:t>by cloud cover or a lack of illumination and can acquire data over a site during day or night time under all weather conditions. </a:t>
+            </a:r>
+          </a:p>
+        </p:txBody>
+      </p:sp>
+    </p:spTree>
+    <p:extLst>
+      <p:ext uri="{BB962C8B-B14F-4D97-AF65-F5344CB8AC3E}">
+        <p14:creationId xmlns:p14="http://schemas.microsoft.com/office/powerpoint/2010/main" val="2201721855"/>
+      </p:ext>
+    </p:extLst>
+  </p:cSld>
+  <p:clrMapOvr>
+    <a:masterClrMapping/>
+  </p:clrMapOvr>
+  <p:timing>
+    <p:tnLst>
+      <p:par>
+        <p:cTn id="1" dur="indefinite" restart="never" nodeType="tmRoot">
+          <p:childTnLst>
+            <p:seq concurrent="1" nextAc="seek">
+              <p:cTn id="2" dur="indefinite" nodeType="mainSeq">
+                <p:childTnLst>
+                  <p:par>
+                    <p:cTn id="3" fill="hold">
+                      <p:stCondLst>
+                        <p:cond delay="indefinite"/>
+                      </p:stCondLst>
+                      <p:childTnLst>
+                        <p:par>
+                          <p:cTn id="4" fill="hold">
+                            <p:stCondLst>
+                              <p:cond delay="0"/>
+                            </p:stCondLst>
+                            <p:childTnLst>
+                              <p:par>
+                                <p:cTn id="5" presetID="9" presetClass="entr" presetSubtype="0" fill="hold" grpId="0" nodeType="clickEffect">
+                                  <p:stCondLst>
+                                    <p:cond delay="0"/>
+                                  </p:stCondLst>
+                                  <p:childTnLst>
+                                    <p:set>
+                                      <p:cBhvr>
+                                        <p:cTn id="6" dur="1" fill="hold">
+                                          <p:stCondLst>
+                                            <p:cond delay="0"/>
+                                          </p:stCondLst>
+                                        </p:cTn>
+                                        <p:tgtEl>
+                                          <p:spTgt spid="3">
+                                            <p:txEl>
+                                              <p:pRg st="1" end="1"/>
+                                            </p:txEl>
+                                          </p:spTgt>
+                                        </p:tgtEl>
+                                        <p:attrNameLst>
+                                          <p:attrName>style.visibility</p:attrName>
+                                        </p:attrNameLst>
+                                      </p:cBhvr>
+                                      <p:to>
+                                        <p:strVal val="visible"/>
+                                      </p:to>
+                                    </p:set>
+                                    <p:animEffect transition="in" filter="dissolve">
+                                      <p:cBhvr>
+                                        <p:cTn id="7" dur="500"/>
+                                        <p:tgtEl>
+                                          <p:spTgt spid="3">
+                                            <p:txEl>
+                                              <p:pRg st="1" end="1"/>
+                                            </p:txEl>
+                                          </p:spTgt>
+                                        </p:tgtEl>
+                                      </p:cBhvr>
+                                    </p:animEffect>
+                                  </p:childTnLst>
+                                </p:cTn>
+                              </p:par>
+                            </p:childTnLst>
+                          </p:cTn>
+                        </p:par>
+                      </p:childTnLst>
+                    </p:cTn>
+                  </p:par>
+                </p:childTnLst>
+              </p:cTn>
+              <p:prevCondLst>
+                <p:cond evt="onPrev" delay="0">
+                  <p:tgtEl>
+                    <p:sldTgt/>
+                  </p:tgtEl>
+                </p:cond>
+              </p:prevCondLst>
+              <p:nextCondLst>
+                <p:cond evt="onNext" delay="0">
+                  <p:tgtEl>
+                    <p:sldTgt/>
+                  </p:tgtEl>
+                </p:cond>
+              </p:nextCondLst>
+            </p:seq>
+          </p:childTnLst>
+        </p:cTn>
+      </p:par>
+    </p:tnLst>
+    <p:bldLst>
+      <p:bldP spid="3" grpId="0" build="p"/>
+    </p:bldLst>
+  </p:timing>
+</p:sld>
+</file>
+
+<file path=ppt/slides/slide7.xml><?xml version="1.0" encoding="utf-8"?>
+<p:sld xmlns:a="http://schemas.openxmlformats.org/drawingml/2006/main" xmlns:r="http://schemas.openxmlformats.org/officeDocument/2006/relationships" xmlns:p="http://schemas.openxmlformats.org/presentationml/2006/main">
+  <p:cSld>
+    <p:spTree>
+      <p:nvGrpSpPr>
+        <p:cNvPr id="1" name=""/>
+        <p:cNvGrpSpPr/>
+        <p:nvPr/>
+      </p:nvGrpSpPr>
+      <p:grpSpPr>
+        <a:xfrm>
+          <a:off x="0" y="0"/>
+          <a:ext cx="0" cy="0"/>
+          <a:chOff x="0" y="0"/>
+          <a:chExt cx="0" cy="0"/>
+        </a:xfrm>
+      </p:grpSpPr>
+      <p:sp>
+        <p:nvSpPr>
+          <p:cNvPr id="2" name="Title 1"/>
+          <p:cNvSpPr>
+            <a:spLocks noGrp="1"/>
+          </p:cNvSpPr>
+          <p:nvPr>
+            <p:ph type="title"/>
+          </p:nvPr>
+        </p:nvSpPr>
+        <p:spPr/>
+        <p:txBody>
+          <a:bodyPr/>
+          <a:lstStyle/>
+          <a:p>
+            <a:r>
+              <a:rPr lang="en-GB" dirty="0" smtClean="0"/>
+              <a:t>What is radar?</a:t>
+            </a:r>
+            <a:br>
+              <a:rPr lang="en-GB" dirty="0" smtClean="0"/>
+            </a:br>
+            <a:endParaRPr lang="en-GB" dirty="0"/>
+          </a:p>
+        </p:txBody>
+      </p:sp>
+      <p:sp>
+        <p:nvSpPr>
+          <p:cNvPr id="3" name="Content Placeholder 2"/>
+          <p:cNvSpPr>
+            <a:spLocks noGrp="1"/>
+          </p:cNvSpPr>
+          <p:nvPr>
+            <p:ph idx="1"/>
+          </p:nvPr>
+        </p:nvSpPr>
+        <p:spPr>
+          <a:xfrm>
+            <a:off x="677333" y="1564184"/>
+            <a:ext cx="8596668" cy="2807093"/>
+          </a:xfrm>
+        </p:spPr>
+        <p:txBody>
+          <a:bodyPr/>
+          <a:lstStyle/>
+          <a:p>
+            <a:r>
+              <a:rPr lang="en-GB" sz="2600" dirty="0" smtClean="0"/>
+              <a:t>Radar </a:t>
+            </a:r>
+            <a:r>
+              <a:rPr lang="en-GB" sz="2600" dirty="0" smtClean="0"/>
+              <a:t>can detect </a:t>
+            </a:r>
+            <a:r>
+              <a:rPr lang="en-GB" sz="2600" b="1" dirty="0" smtClean="0"/>
+              <a:t>solid</a:t>
+            </a:r>
+            <a:r>
+              <a:rPr lang="en-GB" sz="2600" dirty="0" smtClean="0"/>
+              <a:t> objects </a:t>
+            </a:r>
+          </a:p>
+          <a:p>
+            <a:r>
+              <a:rPr lang="en-GB" sz="2600" dirty="0" smtClean="0"/>
+              <a:t>Radio waves transmitted by the radar bounce off </a:t>
+            </a:r>
+            <a:r>
+              <a:rPr lang="en-GB" sz="2600" dirty="0" smtClean="0"/>
+              <a:t>objects</a:t>
+            </a:r>
+          </a:p>
+          <a:p>
+            <a:r>
+              <a:rPr lang="en-GB" sz="2600" dirty="0" smtClean="0"/>
+              <a:t>You can work out the distance to an object because you know the speed of the radio wave and can time how long it takes to come back</a:t>
+            </a:r>
+            <a:endParaRPr lang="en-GB" sz="2600" dirty="0" smtClean="0"/>
+          </a:p>
+          <a:p>
+            <a:pPr marL="0" indent="0">
+              <a:buNone/>
+            </a:pPr>
+            <a:endParaRPr lang="en-GB" dirty="0"/>
+          </a:p>
+        </p:txBody>
+      </p:sp>
+      <p:pic>
+        <p:nvPicPr>
+          <p:cNvPr id="4" name="Radar-Final.mp4">
+            <a:hlinkClick r:id="" action="ppaction://media"/>
+          </p:cNvPr>
+          <p:cNvPicPr>
+            <a:picLocks noChangeAspect="1"/>
+          </p:cNvPicPr>
+          <p:nvPr>
+            <a:videoFile r:link="rId2"/>
+            <p:extLst>
+              <p:ext uri="{DAA4B4D4-6D71-4841-9C94-3DE7FCFB9230}">
+                <p14:media xmlns:p14="http://schemas.microsoft.com/office/powerpoint/2010/main" r:embed="rId1"/>
+              </p:ext>
+            </p:extLst>
+          </p:nvPr>
+        </p:nvPicPr>
+        <p:blipFill>
+          <a:blip r:embed="rId4"/>
+          <a:stretch>
+            <a:fillRect/>
+          </a:stretch>
+        </p:blipFill>
+        <p:spPr>
+          <a:xfrm>
+            <a:off x="677332" y="1930400"/>
+            <a:ext cx="9715603" cy="4671839"/>
+          </a:xfrm>
+          <a:prstGeom prst="rect">
+            <a:avLst/>
+          </a:prstGeom>
+        </p:spPr>
+      </p:pic>
+    </p:spTree>
+    <p:extLst>
+      <p:ext uri="{BB962C8B-B14F-4D97-AF65-F5344CB8AC3E}">
+        <p14:creationId xmlns:p14="http://schemas.microsoft.com/office/powerpoint/2010/main" val="2056532409"/>
+      </p:ext>
+    </p:extLst>
+  </p:cSld>
+  <p:clrMapOvr>
+    <a:masterClrMapping/>
+  </p:clrMapOvr>
+  <p:timing>
+    <p:tnLst>
+      <p:par>
+        <p:cTn id="1" dur="indefinite" restart="never" nodeType="tmRoot">
+          <p:childTnLst>
+            <p:seq concurrent="1" nextAc="seek">
+              <p:cTn id="2" dur="indefinite" nodeType="mainSeq">
+                <p:childTnLst>
+                  <p:par>
+                    <p:cTn id="3" fill="hold">
+                      <p:stCondLst>
+                        <p:cond delay="indefinite"/>
+                      </p:stCondLst>
+                      <p:childTnLst>
+                        <p:par>
+                          <p:cTn id="4" fill="hold">
+                            <p:stCondLst>
+                              <p:cond delay="0"/>
+                            </p:stCondLst>
+                            <p:childTnLst>
+                              <p:par>
+                                <p:cTn id="5" presetID="42" presetClass="entr" presetSubtype="0" fill="hold" grpId="0" nodeType="clickEffect">
+                                  <p:stCondLst>
+                                    <p:cond delay="0"/>
+                                  </p:stCondLst>
+                                  <p:childTnLst>
+                                    <p:set>
+                                      <p:cBhvr>
+                                        <p:cTn id="6" dur="1" fill="hold">
+                                          <p:stCondLst>
+                                            <p:cond delay="0"/>
+                                          </p:stCondLst>
+                                        </p:cTn>
+                                        <p:tgtEl>
+                                          <p:spTgt spid="3">
+                                            <p:txEl>
+                                              <p:pRg st="0" end="0"/>
+                                            </p:txEl>
+                                          </p:spTgt>
+                                        </p:tgtEl>
+                                        <p:attrNameLst>
+                                          <p:attrName>style.visibility</p:attrName>
+                                        </p:attrNameLst>
+                                      </p:cBhvr>
+                                      <p:to>
+                                        <p:strVal val="visible"/>
+                                      </p:to>
+                                    </p:set>
+                                    <p:animEffect transition="in" filter="fade">
+                                      <p:cBhvr>
+                                        <p:cTn id="7" dur="1000"/>
+                                        <p:tgtEl>
+                                          <p:spTgt spid="3">
+                                            <p:txEl>
+                                              <p:pRg st="0" end="0"/>
+                                            </p:txEl>
+                                          </p:spTgt>
+                                        </p:tgtEl>
+                                      </p:cBhvr>
+                                    </p:animEffect>
+                                    <p:anim calcmode="lin" valueType="num">
+                                      <p:cBhvr>
+                                        <p:cTn id="8" dur="1000" fill="hold"/>
+                                        <p:tgtEl>
+                                          <p:spTgt spid="3">
+                                            <p:txEl>
+                                              <p:pRg st="0" end="0"/>
+                                            </p:txEl>
+                                          </p:spTgt>
+                                        </p:tgtEl>
+                                        <p:attrNameLst>
+                                          <p:attrName>ppt_x</p:attrName>
+                                        </p:attrNameLst>
+                                      </p:cBhvr>
+                                      <p:tavLst>
+                                        <p:tav tm="0">
+                                          <p:val>
+                                            <p:strVal val="#ppt_x"/>
+                                          </p:val>
+                                        </p:tav>
+                                        <p:tav tm="100000">
+                                          <p:val>
+                                            <p:strVal val="#ppt_x"/>
+                                          </p:val>
+                                        </p:tav>
+                                      </p:tavLst>
+                                    </p:anim>
+                                    <p:anim calcmode="lin" valueType="num">
+                                      <p:cBhvr>
+                                        <p:cTn id="9" dur="1000" fill="hold"/>
+                                        <p:tgtEl>
+                                          <p:spTgt spid="3">
+                                            <p:txEl>
+                                              <p:pRg st="0" end="0"/>
+                                            </p:txEl>
+                                          </p:spTgt>
+                                        </p:tgtEl>
+                                        <p:attrNameLst>
+                                          <p:attrName>ppt_y</p:attrName>
+                                        </p:attrNameLst>
+                                      </p:cBhvr>
+                                      <p:tavLst>
+                                        <p:tav tm="0">
+                                          <p:val>
+                                            <p:strVal val="#ppt_y+.1"/>
+                                          </p:val>
+                                        </p:tav>
+                                        <p:tav tm="100000">
+                                          <p:val>
+                                            <p:strVal val="#ppt_y"/>
+                                          </p:val>
+                                        </p:tav>
+                                      </p:tavLst>
+                                    </p:anim>
+                                  </p:childTnLst>
+                                </p:cTn>
+                              </p:par>
+                            </p:childTnLst>
+                          </p:cTn>
+                        </p:par>
+                      </p:childTnLst>
+                    </p:cTn>
+                  </p:par>
+                  <p:par>
+                    <p:cTn id="10" fill="hold">
+                      <p:stCondLst>
+                        <p:cond delay="indefinite"/>
+                      </p:stCondLst>
+                      <p:childTnLst>
+                        <p:par>
+                          <p:cTn id="11" fill="hold">
+                            <p:stCondLst>
+                              <p:cond delay="0"/>
+                            </p:stCondLst>
+                            <p:childTnLst>
+                              <p:par>
+                                <p:cTn id="12" presetID="42" presetClass="entr" presetSubtype="0" fill="hold" grpId="0" nodeType="clickEffect">
+                                  <p:stCondLst>
+                                    <p:cond delay="0"/>
+                                  </p:stCondLst>
+                                  <p:childTnLst>
+                                    <p:set>
+                                      <p:cBhvr>
+                                        <p:cTn id="13" dur="1" fill="hold">
+                                          <p:stCondLst>
+                                            <p:cond delay="0"/>
+                                          </p:stCondLst>
+                                        </p:cTn>
+                                        <p:tgtEl>
+                                          <p:spTgt spid="3">
+                                            <p:txEl>
+                                              <p:pRg st="1" end="1"/>
+                                            </p:txEl>
+                                          </p:spTgt>
+                                        </p:tgtEl>
+                                        <p:attrNameLst>
+                                          <p:attrName>style.visibility</p:attrName>
+                                        </p:attrNameLst>
+                                      </p:cBhvr>
+                                      <p:to>
+                                        <p:strVal val="visible"/>
+                                      </p:to>
+                                    </p:set>
+                                    <p:animEffect transition="in" filter="fade">
+                                      <p:cBhvr>
+                                        <p:cTn id="14" dur="1000"/>
+                                        <p:tgtEl>
+                                          <p:spTgt spid="3">
+                                            <p:txEl>
+                                              <p:pRg st="1" end="1"/>
+                                            </p:txEl>
+                                          </p:spTgt>
+                                        </p:tgtEl>
+                                      </p:cBhvr>
+                                    </p:animEffect>
+                                    <p:anim calcmode="lin" valueType="num">
+                                      <p:cBhvr>
+                                        <p:cTn id="15" dur="1000" fill="hold"/>
+                                        <p:tgtEl>
+                                          <p:spTgt spid="3">
+                                            <p:txEl>
+                                              <p:pRg st="1" end="1"/>
+                                            </p:txEl>
+                                          </p:spTgt>
+                                        </p:tgtEl>
+                                        <p:attrNameLst>
+                                          <p:attrName>ppt_x</p:attrName>
+                                        </p:attrNameLst>
+                                      </p:cBhvr>
+                                      <p:tavLst>
+                                        <p:tav tm="0">
+                                          <p:val>
+                                            <p:strVal val="#ppt_x"/>
+                                          </p:val>
+                                        </p:tav>
+                                        <p:tav tm="100000">
+                                          <p:val>
+                                            <p:strVal val="#ppt_x"/>
+                                          </p:val>
+                                        </p:tav>
+                                      </p:tavLst>
+                                    </p:anim>
+                                    <p:anim calcmode="lin" valueType="num">
+                                      <p:cBhvr>
+                                        <p:cTn id="16" dur="1000" fill="hold"/>
+                                        <p:tgtEl>
+                                          <p:spTgt spid="3">
+                                            <p:txEl>
+                                              <p:pRg st="1" end="1"/>
+                                            </p:txEl>
+                                          </p:spTgt>
+                                        </p:tgtEl>
+                                        <p:attrNameLst>
+                                          <p:attrName>ppt_y</p:attrName>
+                                        </p:attrNameLst>
+                                      </p:cBhvr>
+                                      <p:tavLst>
+                                        <p:tav tm="0">
+                                          <p:val>
+                                            <p:strVal val="#ppt_y+.1"/>
+                                          </p:val>
+                                        </p:tav>
+                                        <p:tav tm="100000">
+                                          <p:val>
+                                            <p:strVal val="#ppt_y"/>
+                                          </p:val>
+                                        </p:tav>
+                                      </p:tavLst>
+                                    </p:anim>
+                                  </p:childTnLst>
+                                </p:cTn>
+                              </p:par>
+                            </p:childTnLst>
+                          </p:cTn>
+                        </p:par>
+                      </p:childTnLst>
+                    </p:cTn>
+                  </p:par>
+                  <p:par>
+                    <p:cTn id="17" fill="hold">
+                      <p:stCondLst>
+                        <p:cond delay="indefinite"/>
+                      </p:stCondLst>
+                      <p:childTnLst>
+                        <p:par>
+                          <p:cTn id="18" fill="hold">
+                            <p:stCondLst>
+                              <p:cond delay="0"/>
+                            </p:stCondLst>
+                            <p:childTnLst>
+                              <p:par>
+                                <p:cTn id="19" presetID="42" presetClass="entr" presetSubtype="0" fill="hold" grpId="0" nodeType="clickEffect">
+                                  <p:stCondLst>
+                                    <p:cond delay="0"/>
+                                  </p:stCondLst>
+                                  <p:childTnLst>
+                                    <p:set>
+                                      <p:cBhvr>
+                                        <p:cTn id="20" dur="1" fill="hold">
+                                          <p:stCondLst>
+                                            <p:cond delay="0"/>
+                                          </p:stCondLst>
+                                        </p:cTn>
+                                        <p:tgtEl>
+                                          <p:spTgt spid="3">
+                                            <p:txEl>
+                                              <p:pRg st="2" end="2"/>
+                                            </p:txEl>
+                                          </p:spTgt>
+                                        </p:tgtEl>
+                                        <p:attrNameLst>
+                                          <p:attrName>style.visibility</p:attrName>
+                                        </p:attrNameLst>
+                                      </p:cBhvr>
+                                      <p:to>
+                                        <p:strVal val="visible"/>
+                                      </p:to>
+                                    </p:set>
+                                    <p:animEffect transition="in" filter="fade">
+                                      <p:cBhvr>
+                                        <p:cTn id="21" dur="1000"/>
+                                        <p:tgtEl>
+                                          <p:spTgt spid="3">
+                                            <p:txEl>
+                                              <p:pRg st="2" end="2"/>
+                                            </p:txEl>
+                                          </p:spTgt>
+                                        </p:tgtEl>
+                                      </p:cBhvr>
+                                    </p:animEffect>
+                                    <p:anim calcmode="lin" valueType="num">
+                                      <p:cBhvr>
+                                        <p:cTn id="22" dur="1000" fill="hold"/>
+                                        <p:tgtEl>
+                                          <p:spTgt spid="3">
+                                            <p:txEl>
+                                              <p:pRg st="2" end="2"/>
+                                            </p:txEl>
+                                          </p:spTgt>
+                                        </p:tgtEl>
+                                        <p:attrNameLst>
+                                          <p:attrName>ppt_x</p:attrName>
+                                        </p:attrNameLst>
+                                      </p:cBhvr>
+                                      <p:tavLst>
+                                        <p:tav tm="0">
+                                          <p:val>
+                                            <p:strVal val="#ppt_x"/>
+                                          </p:val>
+                                        </p:tav>
+                                        <p:tav tm="100000">
+                                          <p:val>
+                                            <p:strVal val="#ppt_x"/>
+                                          </p:val>
+                                        </p:tav>
+                                      </p:tavLst>
+                                    </p:anim>
+                                    <p:anim calcmode="lin" valueType="num">
+                                      <p:cBhvr>
+                                        <p:cTn id="23" dur="1000" fill="hold"/>
+                                        <p:tgtEl>
+                                          <p:spTgt spid="3">
+                                            <p:txEl>
+                                              <p:pRg st="2" end="2"/>
+                                            </p:txEl>
+                                          </p:spTgt>
+                                        </p:tgtEl>
+                                        <p:attrNameLst>
+                                          <p:attrName>ppt_y</p:attrName>
+                                        </p:attrNameLst>
+                                      </p:cBhvr>
+                                      <p:tavLst>
+                                        <p:tav tm="0">
+                                          <p:val>
+                                            <p:strVal val="#ppt_y+.1"/>
+                                          </p:val>
+                                        </p:tav>
+                                        <p:tav tm="100000">
+                                          <p:val>
+                                            <p:strVal val="#ppt_y"/>
+                                          </p:val>
+                                        </p:tav>
+                                      </p:tavLst>
+                                    </p:anim>
+                                  </p:childTnLst>
+                                </p:cTn>
+                              </p:par>
+                            </p:childTnLst>
+                          </p:cTn>
+                        </p:par>
+                      </p:childTnLst>
+                    </p:cTn>
+                  </p:par>
+                  <p:par>
+                    <p:cTn id="24" fill="hold">
+                      <p:stCondLst>
+                        <p:cond delay="indefinite"/>
+                      </p:stCondLst>
+                      <p:childTnLst>
+                        <p:par>
+                          <p:cTn id="25" fill="hold">
+                            <p:stCondLst>
+                              <p:cond delay="0"/>
+                            </p:stCondLst>
+                            <p:childTnLst>
+                              <p:par>
+                                <p:cTn id="26" presetID="2" presetClass="entr" presetSubtype="4" fill="hold" nodeType="clickEffect">
+                                  <p:stCondLst>
+                                    <p:cond delay="0"/>
+                                  </p:stCondLst>
+                                  <p:childTnLst>
+                                    <p:set>
+                                      <p:cBhvr>
+                                        <p:cTn id="27" dur="1" fill="hold">
+                                          <p:stCondLst>
+                                            <p:cond delay="0"/>
+                                          </p:stCondLst>
+                                        </p:cTn>
+                                        <p:tgtEl>
+                                          <p:spTgt spid="4"/>
+                                        </p:tgtEl>
+                                        <p:attrNameLst>
+                                          <p:attrName>style.visibility</p:attrName>
+                                        </p:attrNameLst>
+                                      </p:cBhvr>
+                                      <p:to>
+                                        <p:strVal val="visible"/>
+                                      </p:to>
+                                    </p:set>
+                                    <p:anim calcmode="lin" valueType="num">
+                                      <p:cBhvr additive="base">
+                                        <p:cTn id="28" dur="500" fill="hold"/>
+                                        <p:tgtEl>
+                                          <p:spTgt spid="4"/>
+                                        </p:tgtEl>
+                                        <p:attrNameLst>
+                                          <p:attrName>ppt_x</p:attrName>
+                                        </p:attrNameLst>
+                                      </p:cBhvr>
+                                      <p:tavLst>
+                                        <p:tav tm="0">
+                                          <p:val>
+                                            <p:strVal val="#ppt_x"/>
+                                          </p:val>
+                                        </p:tav>
+                                        <p:tav tm="100000">
+                                          <p:val>
+                                            <p:strVal val="#ppt_x"/>
+                                          </p:val>
+                                        </p:tav>
+                                      </p:tavLst>
+                                    </p:anim>
+                                    <p:anim calcmode="lin" valueType="num">
+                                      <p:cBhvr additive="base">
+                                        <p:cTn id="29" dur="500" fill="hold"/>
+                                        <p:tgtEl>
+                                          <p:spTgt spid="4"/>
+                                        </p:tgtEl>
+                                        <p:attrNameLst>
+                                          <p:attrName>ppt_y</p:attrName>
+                                        </p:attrNameLst>
+                                      </p:cBhvr>
+                                      <p:tavLst>
+                                        <p:tav tm="0">
+                                          <p:val>
+                                            <p:strVal val="1+#ppt_h/2"/>
+                                          </p:val>
+                                        </p:tav>
+                                        <p:tav tm="100000">
+                                          <p:val>
+                                            <p:strVal val="#ppt_y"/>
+                                          </p:val>
+                                        </p:tav>
+                                      </p:tavLst>
+                                    </p:anim>
+                                  </p:childTnLst>
+                                </p:cTn>
+                              </p:par>
+                            </p:childTnLst>
+                          </p:cTn>
+                        </p:par>
+                      </p:childTnLst>
+                    </p:cTn>
+                  </p:par>
+                </p:childTnLst>
+              </p:cTn>
+              <p:prevCondLst>
+                <p:cond evt="onPrev" delay="0">
+                  <p:tgtEl>
+                    <p:sldTgt/>
+                  </p:tgtEl>
+                </p:cond>
+              </p:prevCondLst>
+              <p:nextCondLst>
+                <p:cond evt="onNext" delay="0">
+                  <p:tgtEl>
+                    <p:sldTgt/>
+                  </p:tgtEl>
+                </p:cond>
+              </p:nextCondLst>
+            </p:seq>
+            <p:seq concurrent="1" nextAc="seek">
+              <p:cTn id="30" restart="whenNotActive" fill="hold" evtFilter="cancelBubble" nodeType="interactiveSeq">
+                <p:stCondLst>
+                  <p:cond evt="onClick" delay="0">
+                    <p:tgtEl>
+                      <p:spTgt spid="4"/>
+                    </p:tgtEl>
+                  </p:cond>
+                </p:stCondLst>
+                <p:endSync evt="end" delay="0">
+                  <p:rtn val="all"/>
+                </p:endSync>
+                <p:childTnLst>
+                  <p:par>
+                    <p:cTn id="31" fill="hold">
+                      <p:stCondLst>
+                        <p:cond delay="0"/>
+                      </p:stCondLst>
+                      <p:childTnLst>
+                        <p:par>
+                          <p:cTn id="32" fill="hold">
+                            <p:stCondLst>
+                              <p:cond delay="0"/>
+                            </p:stCondLst>
+                            <p:childTnLst>
+                              <p:par>
+                                <p:cTn id="33" presetID="2" presetClass="mediacall" presetSubtype="0" fill="hold" nodeType="clickEffect">
+                                  <p:stCondLst>
+                                    <p:cond delay="0"/>
+                                  </p:stCondLst>
+                                  <p:childTnLst>
+                                    <p:cmd type="call" cmd="togglePause">
+                                      <p:cBhvr>
+                                        <p:cTn id="34" dur="1" fill="hold"/>
+                                        <p:tgtEl>
+                                          <p:spTgt spid="4"/>
+                                        </p:tgtEl>
+                                      </p:cBhvr>
+                                    </p:cmd>
+                                  </p:childTnLst>
+                                </p:cTn>
+                              </p:par>
+                            </p:childTnLst>
+                          </p:cTn>
+                        </p:par>
+                      </p:childTnLst>
+                    </p:cTn>
+                  </p:par>
+                </p:childTnLst>
+              </p:cTn>
+              <p:nextCondLst>
+                <p:cond evt="onClick" delay="0">
+                  <p:tgtEl>
+                    <p:spTgt spid="4"/>
+                  </p:tgtEl>
+                </p:cond>
+              </p:nextCondLst>
+            </p:seq>
+            <p:video>
+              <p:cMediaNode vol="80000">
+                <p:cTn id="35" fill="hold" display="0">
+                  <p:stCondLst>
+                    <p:cond delay="indefinite"/>
+                  </p:stCondLst>
+                </p:cTn>
+                <p:tgtEl>
+                  <p:spTgt spid="4"/>
+                </p:tgtEl>
+              </p:cMediaNode>
+            </p:video>
+          </p:childTnLst>
+        </p:cTn>
+      </p:par>
+    </p:tnLst>
+    <p:bldLst>
+      <p:bldP spid="3" grpId="0" build="p"/>
+    </p:bldLst>
+  </p:timing>
+</p:sld>
+</file>
+
+<file path=ppt/slides/slide8.xml><?xml version="1.0" encoding="utf-8"?>
 <p:sld xmlns:a="http://schemas.openxmlformats.org/drawingml/2006/main" xmlns:r="http://schemas.openxmlformats.org/officeDocument/2006/relationships" xmlns:p="http://schemas.openxmlformats.org/presentationml/2006/main">
   <p:cSld>
     <p:spTree>
@@ -16178,7 +16603,11 @@
           <a:p>
             <a:r>
               <a:rPr lang="en-GB" sz="2600" dirty="0" smtClean="0"/>
-              <a:t>It’s reference system is  Geocentric orbit.</a:t>
+              <a:t>It uses a Geostationary </a:t>
+            </a:r>
+            <a:r>
+              <a:rPr lang="en-GB" sz="2600" dirty="0" smtClean="0"/>
+              <a:t>orbit.</a:t>
             </a:r>
           </a:p>
           <a:p>
@@ -17876,7 +18305,7 @@
 </p:sld>
 </file>
 
-<file path=ppt/slides/slide7.xml><?xml version="1.0" encoding="utf-8"?>
+<file path=ppt/slides/slide9.xml><?xml version="1.0" encoding="utf-8"?>
 <p:sld xmlns:a="http://schemas.openxmlformats.org/drawingml/2006/main" xmlns:r="http://schemas.openxmlformats.org/officeDocument/2006/relationships" xmlns:p="http://schemas.openxmlformats.org/presentationml/2006/main">
   <p:cSld>
     <p:spTree>
@@ -17893,9 +18322,79 @@
           <a:chExt cx="0" cy="0"/>
         </a:xfrm>
       </p:grpSpPr>
+      <p:sp>
+        <p:nvSpPr>
+          <p:cNvPr id="2" name="Title 1"/>
+          <p:cNvSpPr>
+            <a:spLocks noGrp="1"/>
+          </p:cNvSpPr>
+          <p:nvPr>
+            <p:ph type="title"/>
+          </p:nvPr>
+        </p:nvSpPr>
+        <p:spPr>
+          <a:xfrm>
+            <a:off x="677334" y="609600"/>
+            <a:ext cx="8596668" cy="845713"/>
+          </a:xfrm>
+        </p:spPr>
+        <p:txBody>
+          <a:bodyPr/>
+          <a:lstStyle/>
+          <a:p>
+            <a:pPr algn="ctr"/>
+            <a:r>
+              <a:rPr lang="en-GB" b="1" dirty="0" smtClean="0"/>
+              <a:t>Landsat 8</a:t>
+            </a:r>
+            <a:endParaRPr lang="en-GB" b="1" dirty="0"/>
+          </a:p>
+        </p:txBody>
+      </p:sp>
+      <p:sp>
+        <p:nvSpPr>
+          <p:cNvPr id="3" name="Content Placeholder 2"/>
+          <p:cNvSpPr>
+            <a:spLocks noGrp="1"/>
+          </p:cNvSpPr>
+          <p:nvPr>
+            <p:ph idx="1"/>
+          </p:nvPr>
+        </p:nvSpPr>
+        <p:spPr>
+          <a:xfrm>
+            <a:off x="677334" y="1455313"/>
+            <a:ext cx="7704666" cy="4586049"/>
+          </a:xfrm>
+        </p:spPr>
+        <p:txBody>
+          <a:bodyPr>
+            <a:normAutofit/>
+          </a:bodyPr>
+          <a:lstStyle/>
+          <a:p>
+            <a:r>
+              <a:rPr lang="en-GB" sz="2600" dirty="0" smtClean="0"/>
+              <a:t>Uses infrared light to measure the temperature of the earth</a:t>
+            </a:r>
+          </a:p>
+          <a:p>
+            <a:r>
+              <a:rPr lang="en-GB" sz="2600" dirty="0" smtClean="0"/>
+              <a:t>Can build land/sea surface temperature maps</a:t>
+            </a:r>
+          </a:p>
+          <a:p>
+            <a:r>
+              <a:rPr lang="en-GB" sz="2600" dirty="0" smtClean="0"/>
+              <a:t>Clouds absorb infrared light so satellite can only see the top of the clouds.</a:t>
+            </a:r>
+          </a:p>
+        </p:txBody>
+      </p:sp>
       <p:pic>
         <p:nvPicPr>
-          <p:cNvPr id="6154" name="Picture 10" descr="Image result for space"/>
+          <p:cNvPr id="5124" name="Picture 4" descr="Image result for landsat 8"/>
           <p:cNvPicPr>
             <a:picLocks noChangeAspect="1" noChangeArrowheads="1"/>
           </p:cNvPicPr>
@@ -17916,8 +18415,8 @@
         </p:blipFill>
         <p:spPr bwMode="auto">
           <a:xfrm>
-            <a:off x="0" y="0"/>
-            <a:ext cx="12192000" cy="6883715"/>
+            <a:off x="8382000" y="0"/>
+            <a:ext cx="3810000" cy="2143125"/>
           </a:xfrm>
           <a:prstGeom prst="rect">
             <a:avLst/>
@@ -17934,49 +18433,10 @@
           </a:extLst>
         </p:spPr>
       </p:pic>
-      <p:sp>
-        <p:nvSpPr>
-          <p:cNvPr id="2" name="Title 1"/>
-          <p:cNvSpPr>
-            <a:spLocks noGrp="1"/>
-          </p:cNvSpPr>
-          <p:nvPr>
-            <p:ph type="title"/>
-          </p:nvPr>
-        </p:nvSpPr>
-        <p:spPr>
-          <a:xfrm>
-            <a:off x="677334" y="2144684"/>
-            <a:ext cx="10893982" cy="3486858"/>
-          </a:xfrm>
-        </p:spPr>
-        <p:txBody>
-          <a:bodyPr>
-            <a:noAutofit/>
-          </a:bodyPr>
-          <a:lstStyle/>
-          <a:p>
-            <a:pPr algn="ctr"/>
-            <a:r>
-              <a:rPr lang="en-GB" sz="17000" u="sng" dirty="0" smtClean="0">
-                <a:solidFill>
-                  <a:srgbClr val="0070C0"/>
-                </a:solidFill>
-              </a:rPr>
-              <a:t>The End!!!</a:t>
-            </a:r>
-            <a:endParaRPr lang="en-GB" sz="17000" u="sng" dirty="0">
-              <a:solidFill>
-                <a:srgbClr val="0070C0"/>
-              </a:solidFill>
-            </a:endParaRPr>
-          </a:p>
-        </p:txBody>
-      </p:sp>
     </p:spTree>
     <p:extLst>
       <p:ext uri="{BB962C8B-B14F-4D97-AF65-F5344CB8AC3E}">
-        <p14:creationId xmlns:p14="http://schemas.microsoft.com/office/powerpoint/2010/main" val="4056443852"/>
+        <p14:creationId xmlns:p14="http://schemas.microsoft.com/office/powerpoint/2010/main" val="1167565822"/>
       </p:ext>
     </p:extLst>
   </p:cSld>
@@ -18113,6 +18573,1127 @@
                       </p:childTnLst>
                     </p:cTn>
                   </p:par>
+                  <p:par>
+                    <p:cTn id="11" fill="hold">
+                      <p:stCondLst>
+                        <p:cond delay="indefinite"/>
+                      </p:stCondLst>
+                      <p:childTnLst>
+                        <p:par>
+                          <p:cTn id="12" fill="hold">
+                            <p:stCondLst>
+                              <p:cond delay="0"/>
+                            </p:stCondLst>
+                            <p:childTnLst>
+                              <p:par>
+                                <p:cTn id="13" presetID="26" presetClass="entr" presetSubtype="0" fill="hold" grpId="0" nodeType="clickEffect">
+                                  <p:stCondLst>
+                                    <p:cond delay="0"/>
+                                  </p:stCondLst>
+                                  <p:childTnLst>
+                                    <p:set>
+                                      <p:cBhvr>
+                                        <p:cTn id="14" dur="1" fill="hold">
+                                          <p:stCondLst>
+                                            <p:cond delay="0"/>
+                                          </p:stCondLst>
+                                        </p:cTn>
+                                        <p:tgtEl>
+                                          <p:spTgt spid="3">
+                                            <p:txEl>
+                                              <p:pRg st="0" end="0"/>
+                                            </p:txEl>
+                                          </p:spTgt>
+                                        </p:tgtEl>
+                                        <p:attrNameLst>
+                                          <p:attrName>style.visibility</p:attrName>
+                                        </p:attrNameLst>
+                                      </p:cBhvr>
+                                      <p:to>
+                                        <p:strVal val="visible"/>
+                                      </p:to>
+                                    </p:set>
+                                    <p:animEffect transition="in" filter="wipe(down)">
+                                      <p:cBhvr>
+                                        <p:cTn id="15" dur="580">
+                                          <p:stCondLst>
+                                            <p:cond delay="0"/>
+                                          </p:stCondLst>
+                                        </p:cTn>
+                                        <p:tgtEl>
+                                          <p:spTgt spid="3">
+                                            <p:txEl>
+                                              <p:pRg st="0" end="0"/>
+                                            </p:txEl>
+                                          </p:spTgt>
+                                        </p:tgtEl>
+                                      </p:cBhvr>
+                                    </p:animEffect>
+                                    <p:anim calcmode="lin" valueType="num">
+                                      <p:cBhvr>
+                                        <p:cTn id="16" dur="1822" tmFilter="0,0; 0.14,0.36; 0.43,0.73; 0.71,0.91; 1.0,1.0">
+                                          <p:stCondLst>
+                                            <p:cond delay="0"/>
+                                          </p:stCondLst>
+                                        </p:cTn>
+                                        <p:tgtEl>
+                                          <p:spTgt spid="3">
+                                            <p:txEl>
+                                              <p:pRg st="0" end="0"/>
+                                            </p:txEl>
+                                          </p:spTgt>
+                                        </p:tgtEl>
+                                        <p:attrNameLst>
+                                          <p:attrName>ppt_x</p:attrName>
+                                        </p:attrNameLst>
+                                      </p:cBhvr>
+                                      <p:tavLst>
+                                        <p:tav tm="0">
+                                          <p:val>
+                                            <p:strVal val="#ppt_x-0.25"/>
+                                          </p:val>
+                                        </p:tav>
+                                        <p:tav tm="100000">
+                                          <p:val>
+                                            <p:strVal val="#ppt_x"/>
+                                          </p:val>
+                                        </p:tav>
+                                      </p:tavLst>
+                                    </p:anim>
+                                    <p:anim calcmode="lin" valueType="num">
+                                      <p:cBhvr>
+                                        <p:cTn id="17" dur="664" tmFilter="0.0,0.0; 0.25,0.07; 0.50,0.2; 0.75,0.467; 1.0,1.0">
+                                          <p:stCondLst>
+                                            <p:cond delay="0"/>
+                                          </p:stCondLst>
+                                        </p:cTn>
+                                        <p:tgtEl>
+                                          <p:spTgt spid="3">
+                                            <p:txEl>
+                                              <p:pRg st="0" end="0"/>
+                                            </p:txEl>
+                                          </p:spTgt>
+                                        </p:tgtEl>
+                                        <p:attrNameLst>
+                                          <p:attrName>ppt_y</p:attrName>
+                                        </p:attrNameLst>
+                                      </p:cBhvr>
+                                      <p:tavLst>
+                                        <p:tav tm="0" fmla="#ppt_y-sin(pi*$)/3">
+                                          <p:val>
+                                            <p:fltVal val="0.5"/>
+                                          </p:val>
+                                        </p:tav>
+                                        <p:tav tm="100000">
+                                          <p:val>
+                                            <p:fltVal val="1"/>
+                                          </p:val>
+                                        </p:tav>
+                                      </p:tavLst>
+                                    </p:anim>
+                                    <p:anim calcmode="lin" valueType="num">
+                                      <p:cBhvr>
+                                        <p:cTn id="18" dur="664" tmFilter="0, 0; 0.125,0.2665; 0.25,0.4; 0.375,0.465; 0.5,0.5;  0.625,0.535; 0.75,0.6; 0.875,0.7335; 1,1">
+                                          <p:stCondLst>
+                                            <p:cond delay="664"/>
+                                          </p:stCondLst>
+                                        </p:cTn>
+                                        <p:tgtEl>
+                                          <p:spTgt spid="3">
+                                            <p:txEl>
+                                              <p:pRg st="0" end="0"/>
+                                            </p:txEl>
+                                          </p:spTgt>
+                                        </p:tgtEl>
+                                        <p:attrNameLst>
+                                          <p:attrName>ppt_y</p:attrName>
+                                        </p:attrNameLst>
+                                      </p:cBhvr>
+                                      <p:tavLst>
+                                        <p:tav tm="0" fmla="#ppt_y-sin(pi*$)/9">
+                                          <p:val>
+                                            <p:fltVal val="0"/>
+                                          </p:val>
+                                        </p:tav>
+                                        <p:tav tm="100000">
+                                          <p:val>
+                                            <p:fltVal val="1"/>
+                                          </p:val>
+                                        </p:tav>
+                                      </p:tavLst>
+                                    </p:anim>
+                                    <p:anim calcmode="lin" valueType="num">
+                                      <p:cBhvr>
+                                        <p:cTn id="19" dur="332" tmFilter="0, 0; 0.125,0.2665; 0.25,0.4; 0.375,0.465; 0.5,0.5;  0.625,0.535; 0.75,0.6; 0.875,0.7335; 1,1">
+                                          <p:stCondLst>
+                                            <p:cond delay="1324"/>
+                                          </p:stCondLst>
+                                        </p:cTn>
+                                        <p:tgtEl>
+                                          <p:spTgt spid="3">
+                                            <p:txEl>
+                                              <p:pRg st="0" end="0"/>
+                                            </p:txEl>
+                                          </p:spTgt>
+                                        </p:tgtEl>
+                                        <p:attrNameLst>
+                                          <p:attrName>ppt_y</p:attrName>
+                                        </p:attrNameLst>
+                                      </p:cBhvr>
+                                      <p:tavLst>
+                                        <p:tav tm="0" fmla="#ppt_y-sin(pi*$)/27">
+                                          <p:val>
+                                            <p:fltVal val="0"/>
+                                          </p:val>
+                                        </p:tav>
+                                        <p:tav tm="100000">
+                                          <p:val>
+                                            <p:fltVal val="1"/>
+                                          </p:val>
+                                        </p:tav>
+                                      </p:tavLst>
+                                    </p:anim>
+                                    <p:anim calcmode="lin" valueType="num">
+                                      <p:cBhvr>
+                                        <p:cTn id="20" dur="164" tmFilter="0, 0; 0.125,0.2665; 0.25,0.4; 0.375,0.465; 0.5,0.5;  0.625,0.535; 0.75,0.6; 0.875,0.7335; 1,1">
+                                          <p:stCondLst>
+                                            <p:cond delay="1656"/>
+                                          </p:stCondLst>
+                                        </p:cTn>
+                                        <p:tgtEl>
+                                          <p:spTgt spid="3">
+                                            <p:txEl>
+                                              <p:pRg st="0" end="0"/>
+                                            </p:txEl>
+                                          </p:spTgt>
+                                        </p:tgtEl>
+                                        <p:attrNameLst>
+                                          <p:attrName>ppt_y</p:attrName>
+                                        </p:attrNameLst>
+                                      </p:cBhvr>
+                                      <p:tavLst>
+                                        <p:tav tm="0" fmla="#ppt_y-sin(pi*$)/81">
+                                          <p:val>
+                                            <p:fltVal val="0"/>
+                                          </p:val>
+                                        </p:tav>
+                                        <p:tav tm="100000">
+                                          <p:val>
+                                            <p:fltVal val="1"/>
+                                          </p:val>
+                                        </p:tav>
+                                      </p:tavLst>
+                                    </p:anim>
+                                    <p:animScale>
+                                      <p:cBhvr>
+                                        <p:cTn id="21" dur="26">
+                                          <p:stCondLst>
+                                            <p:cond delay="650"/>
+                                          </p:stCondLst>
+                                        </p:cTn>
+                                        <p:tgtEl>
+                                          <p:spTgt spid="3">
+                                            <p:txEl>
+                                              <p:pRg st="0" end="0"/>
+                                            </p:txEl>
+                                          </p:spTgt>
+                                        </p:tgtEl>
+                                      </p:cBhvr>
+                                      <p:to x="100000" y="60000"/>
+                                    </p:animScale>
+                                    <p:animScale>
+                                      <p:cBhvr>
+                                        <p:cTn id="22" dur="166" decel="50000">
+                                          <p:stCondLst>
+                                            <p:cond delay="676"/>
+                                          </p:stCondLst>
+                                        </p:cTn>
+                                        <p:tgtEl>
+                                          <p:spTgt spid="3">
+                                            <p:txEl>
+                                              <p:pRg st="0" end="0"/>
+                                            </p:txEl>
+                                          </p:spTgt>
+                                        </p:tgtEl>
+                                      </p:cBhvr>
+                                      <p:to x="100000" y="100000"/>
+                                    </p:animScale>
+                                    <p:animScale>
+                                      <p:cBhvr>
+                                        <p:cTn id="23" dur="26">
+                                          <p:stCondLst>
+                                            <p:cond delay="1312"/>
+                                          </p:stCondLst>
+                                        </p:cTn>
+                                        <p:tgtEl>
+                                          <p:spTgt spid="3">
+                                            <p:txEl>
+                                              <p:pRg st="0" end="0"/>
+                                            </p:txEl>
+                                          </p:spTgt>
+                                        </p:tgtEl>
+                                      </p:cBhvr>
+                                      <p:to x="100000" y="80000"/>
+                                    </p:animScale>
+                                    <p:animScale>
+                                      <p:cBhvr>
+                                        <p:cTn id="24" dur="166" decel="50000">
+                                          <p:stCondLst>
+                                            <p:cond delay="1338"/>
+                                          </p:stCondLst>
+                                        </p:cTn>
+                                        <p:tgtEl>
+                                          <p:spTgt spid="3">
+                                            <p:txEl>
+                                              <p:pRg st="0" end="0"/>
+                                            </p:txEl>
+                                          </p:spTgt>
+                                        </p:tgtEl>
+                                      </p:cBhvr>
+                                      <p:to x="100000" y="100000"/>
+                                    </p:animScale>
+                                    <p:animScale>
+                                      <p:cBhvr>
+                                        <p:cTn id="25" dur="26">
+                                          <p:stCondLst>
+                                            <p:cond delay="1642"/>
+                                          </p:stCondLst>
+                                        </p:cTn>
+                                        <p:tgtEl>
+                                          <p:spTgt spid="3">
+                                            <p:txEl>
+                                              <p:pRg st="0" end="0"/>
+                                            </p:txEl>
+                                          </p:spTgt>
+                                        </p:tgtEl>
+                                      </p:cBhvr>
+                                      <p:to x="100000" y="90000"/>
+                                    </p:animScale>
+                                    <p:animScale>
+                                      <p:cBhvr>
+                                        <p:cTn id="26" dur="166" decel="50000">
+                                          <p:stCondLst>
+                                            <p:cond delay="1668"/>
+                                          </p:stCondLst>
+                                        </p:cTn>
+                                        <p:tgtEl>
+                                          <p:spTgt spid="3">
+                                            <p:txEl>
+                                              <p:pRg st="0" end="0"/>
+                                            </p:txEl>
+                                          </p:spTgt>
+                                        </p:tgtEl>
+                                      </p:cBhvr>
+                                      <p:to x="100000" y="100000"/>
+                                    </p:animScale>
+                                    <p:animScale>
+                                      <p:cBhvr>
+                                        <p:cTn id="27" dur="26">
+                                          <p:stCondLst>
+                                            <p:cond delay="1808"/>
+                                          </p:stCondLst>
+                                        </p:cTn>
+                                        <p:tgtEl>
+                                          <p:spTgt spid="3">
+                                            <p:txEl>
+                                              <p:pRg st="0" end="0"/>
+                                            </p:txEl>
+                                          </p:spTgt>
+                                        </p:tgtEl>
+                                      </p:cBhvr>
+                                      <p:to x="100000" y="95000"/>
+                                    </p:animScale>
+                                    <p:animScale>
+                                      <p:cBhvr>
+                                        <p:cTn id="28" dur="166" decel="50000">
+                                          <p:stCondLst>
+                                            <p:cond delay="1834"/>
+                                          </p:stCondLst>
+                                        </p:cTn>
+                                        <p:tgtEl>
+                                          <p:spTgt spid="3">
+                                            <p:txEl>
+                                              <p:pRg st="0" end="0"/>
+                                            </p:txEl>
+                                          </p:spTgt>
+                                        </p:tgtEl>
+                                      </p:cBhvr>
+                                      <p:to x="100000" y="100000"/>
+                                    </p:animScale>
+                                  </p:childTnLst>
+                                </p:cTn>
+                              </p:par>
+                            </p:childTnLst>
+                          </p:cTn>
+                        </p:par>
+                      </p:childTnLst>
+                    </p:cTn>
+                  </p:par>
+                  <p:par>
+                    <p:cTn id="29" fill="hold">
+                      <p:stCondLst>
+                        <p:cond delay="indefinite"/>
+                      </p:stCondLst>
+                      <p:childTnLst>
+                        <p:par>
+                          <p:cTn id="30" fill="hold">
+                            <p:stCondLst>
+                              <p:cond delay="0"/>
+                            </p:stCondLst>
+                            <p:childTnLst>
+                              <p:par>
+                                <p:cTn id="31" presetID="26" presetClass="entr" presetSubtype="0" fill="hold" grpId="0" nodeType="clickEffect">
+                                  <p:stCondLst>
+                                    <p:cond delay="0"/>
+                                  </p:stCondLst>
+                                  <p:childTnLst>
+                                    <p:set>
+                                      <p:cBhvr>
+                                        <p:cTn id="32" dur="1" fill="hold">
+                                          <p:stCondLst>
+                                            <p:cond delay="0"/>
+                                          </p:stCondLst>
+                                        </p:cTn>
+                                        <p:tgtEl>
+                                          <p:spTgt spid="3">
+                                            <p:txEl>
+                                              <p:pRg st="1" end="1"/>
+                                            </p:txEl>
+                                          </p:spTgt>
+                                        </p:tgtEl>
+                                        <p:attrNameLst>
+                                          <p:attrName>style.visibility</p:attrName>
+                                        </p:attrNameLst>
+                                      </p:cBhvr>
+                                      <p:to>
+                                        <p:strVal val="visible"/>
+                                      </p:to>
+                                    </p:set>
+                                    <p:animEffect transition="in" filter="wipe(down)">
+                                      <p:cBhvr>
+                                        <p:cTn id="33" dur="580">
+                                          <p:stCondLst>
+                                            <p:cond delay="0"/>
+                                          </p:stCondLst>
+                                        </p:cTn>
+                                        <p:tgtEl>
+                                          <p:spTgt spid="3">
+                                            <p:txEl>
+                                              <p:pRg st="1" end="1"/>
+                                            </p:txEl>
+                                          </p:spTgt>
+                                        </p:tgtEl>
+                                      </p:cBhvr>
+                                    </p:animEffect>
+                                    <p:anim calcmode="lin" valueType="num">
+                                      <p:cBhvr>
+                                        <p:cTn id="34" dur="1822" tmFilter="0,0; 0.14,0.36; 0.43,0.73; 0.71,0.91; 1.0,1.0">
+                                          <p:stCondLst>
+                                            <p:cond delay="0"/>
+                                          </p:stCondLst>
+                                        </p:cTn>
+                                        <p:tgtEl>
+                                          <p:spTgt spid="3">
+                                            <p:txEl>
+                                              <p:pRg st="1" end="1"/>
+                                            </p:txEl>
+                                          </p:spTgt>
+                                        </p:tgtEl>
+                                        <p:attrNameLst>
+                                          <p:attrName>ppt_x</p:attrName>
+                                        </p:attrNameLst>
+                                      </p:cBhvr>
+                                      <p:tavLst>
+                                        <p:tav tm="0">
+                                          <p:val>
+                                            <p:strVal val="#ppt_x-0.25"/>
+                                          </p:val>
+                                        </p:tav>
+                                        <p:tav tm="100000">
+                                          <p:val>
+                                            <p:strVal val="#ppt_x"/>
+                                          </p:val>
+                                        </p:tav>
+                                      </p:tavLst>
+                                    </p:anim>
+                                    <p:anim calcmode="lin" valueType="num">
+                                      <p:cBhvr>
+                                        <p:cTn id="35" dur="664" tmFilter="0.0,0.0; 0.25,0.07; 0.50,0.2; 0.75,0.467; 1.0,1.0">
+                                          <p:stCondLst>
+                                            <p:cond delay="0"/>
+                                          </p:stCondLst>
+                                        </p:cTn>
+                                        <p:tgtEl>
+                                          <p:spTgt spid="3">
+                                            <p:txEl>
+                                              <p:pRg st="1" end="1"/>
+                                            </p:txEl>
+                                          </p:spTgt>
+                                        </p:tgtEl>
+                                        <p:attrNameLst>
+                                          <p:attrName>ppt_y</p:attrName>
+                                        </p:attrNameLst>
+                                      </p:cBhvr>
+                                      <p:tavLst>
+                                        <p:tav tm="0" fmla="#ppt_y-sin(pi*$)/3">
+                                          <p:val>
+                                            <p:fltVal val="0.5"/>
+                                          </p:val>
+                                        </p:tav>
+                                        <p:tav tm="100000">
+                                          <p:val>
+                                            <p:fltVal val="1"/>
+                                          </p:val>
+                                        </p:tav>
+                                      </p:tavLst>
+                                    </p:anim>
+                                    <p:anim calcmode="lin" valueType="num">
+                                      <p:cBhvr>
+                                        <p:cTn id="36" dur="664" tmFilter="0, 0; 0.125,0.2665; 0.25,0.4; 0.375,0.465; 0.5,0.5;  0.625,0.535; 0.75,0.6; 0.875,0.7335; 1,1">
+                                          <p:stCondLst>
+                                            <p:cond delay="664"/>
+                                          </p:stCondLst>
+                                        </p:cTn>
+                                        <p:tgtEl>
+                                          <p:spTgt spid="3">
+                                            <p:txEl>
+                                              <p:pRg st="1" end="1"/>
+                                            </p:txEl>
+                                          </p:spTgt>
+                                        </p:tgtEl>
+                                        <p:attrNameLst>
+                                          <p:attrName>ppt_y</p:attrName>
+                                        </p:attrNameLst>
+                                      </p:cBhvr>
+                                      <p:tavLst>
+                                        <p:tav tm="0" fmla="#ppt_y-sin(pi*$)/9">
+                                          <p:val>
+                                            <p:fltVal val="0"/>
+                                          </p:val>
+                                        </p:tav>
+                                        <p:tav tm="100000">
+                                          <p:val>
+                                            <p:fltVal val="1"/>
+                                          </p:val>
+                                        </p:tav>
+                                      </p:tavLst>
+                                    </p:anim>
+                                    <p:anim calcmode="lin" valueType="num">
+                                      <p:cBhvr>
+                                        <p:cTn id="37" dur="332" tmFilter="0, 0; 0.125,0.2665; 0.25,0.4; 0.375,0.465; 0.5,0.5;  0.625,0.535; 0.75,0.6; 0.875,0.7335; 1,1">
+                                          <p:stCondLst>
+                                            <p:cond delay="1324"/>
+                                          </p:stCondLst>
+                                        </p:cTn>
+                                        <p:tgtEl>
+                                          <p:spTgt spid="3">
+                                            <p:txEl>
+                                              <p:pRg st="1" end="1"/>
+                                            </p:txEl>
+                                          </p:spTgt>
+                                        </p:tgtEl>
+                                        <p:attrNameLst>
+                                          <p:attrName>ppt_y</p:attrName>
+                                        </p:attrNameLst>
+                                      </p:cBhvr>
+                                      <p:tavLst>
+                                        <p:tav tm="0" fmla="#ppt_y-sin(pi*$)/27">
+                                          <p:val>
+                                            <p:fltVal val="0"/>
+                                          </p:val>
+                                        </p:tav>
+                                        <p:tav tm="100000">
+                                          <p:val>
+                                            <p:fltVal val="1"/>
+                                          </p:val>
+                                        </p:tav>
+                                      </p:tavLst>
+                                    </p:anim>
+                                    <p:anim calcmode="lin" valueType="num">
+                                      <p:cBhvr>
+                                        <p:cTn id="38" dur="164" tmFilter="0, 0; 0.125,0.2665; 0.25,0.4; 0.375,0.465; 0.5,0.5;  0.625,0.535; 0.75,0.6; 0.875,0.7335; 1,1">
+                                          <p:stCondLst>
+                                            <p:cond delay="1656"/>
+                                          </p:stCondLst>
+                                        </p:cTn>
+                                        <p:tgtEl>
+                                          <p:spTgt spid="3">
+                                            <p:txEl>
+                                              <p:pRg st="1" end="1"/>
+                                            </p:txEl>
+                                          </p:spTgt>
+                                        </p:tgtEl>
+                                        <p:attrNameLst>
+                                          <p:attrName>ppt_y</p:attrName>
+                                        </p:attrNameLst>
+                                      </p:cBhvr>
+                                      <p:tavLst>
+                                        <p:tav tm="0" fmla="#ppt_y-sin(pi*$)/81">
+                                          <p:val>
+                                            <p:fltVal val="0"/>
+                                          </p:val>
+                                        </p:tav>
+                                        <p:tav tm="100000">
+                                          <p:val>
+                                            <p:fltVal val="1"/>
+                                          </p:val>
+                                        </p:tav>
+                                      </p:tavLst>
+                                    </p:anim>
+                                    <p:animScale>
+                                      <p:cBhvr>
+                                        <p:cTn id="39" dur="26">
+                                          <p:stCondLst>
+                                            <p:cond delay="650"/>
+                                          </p:stCondLst>
+                                        </p:cTn>
+                                        <p:tgtEl>
+                                          <p:spTgt spid="3">
+                                            <p:txEl>
+                                              <p:pRg st="1" end="1"/>
+                                            </p:txEl>
+                                          </p:spTgt>
+                                        </p:tgtEl>
+                                      </p:cBhvr>
+                                      <p:to x="100000" y="60000"/>
+                                    </p:animScale>
+                                    <p:animScale>
+                                      <p:cBhvr>
+                                        <p:cTn id="40" dur="166" decel="50000">
+                                          <p:stCondLst>
+                                            <p:cond delay="676"/>
+                                          </p:stCondLst>
+                                        </p:cTn>
+                                        <p:tgtEl>
+                                          <p:spTgt spid="3">
+                                            <p:txEl>
+                                              <p:pRg st="1" end="1"/>
+                                            </p:txEl>
+                                          </p:spTgt>
+                                        </p:tgtEl>
+                                      </p:cBhvr>
+                                      <p:to x="100000" y="100000"/>
+                                    </p:animScale>
+                                    <p:animScale>
+                                      <p:cBhvr>
+                                        <p:cTn id="41" dur="26">
+                                          <p:stCondLst>
+                                            <p:cond delay="1312"/>
+                                          </p:stCondLst>
+                                        </p:cTn>
+                                        <p:tgtEl>
+                                          <p:spTgt spid="3">
+                                            <p:txEl>
+                                              <p:pRg st="1" end="1"/>
+                                            </p:txEl>
+                                          </p:spTgt>
+                                        </p:tgtEl>
+                                      </p:cBhvr>
+                                      <p:to x="100000" y="80000"/>
+                                    </p:animScale>
+                                    <p:animScale>
+                                      <p:cBhvr>
+                                        <p:cTn id="42" dur="166" decel="50000">
+                                          <p:stCondLst>
+                                            <p:cond delay="1338"/>
+                                          </p:stCondLst>
+                                        </p:cTn>
+                                        <p:tgtEl>
+                                          <p:spTgt spid="3">
+                                            <p:txEl>
+                                              <p:pRg st="1" end="1"/>
+                                            </p:txEl>
+                                          </p:spTgt>
+                                        </p:tgtEl>
+                                      </p:cBhvr>
+                                      <p:to x="100000" y="100000"/>
+                                    </p:animScale>
+                                    <p:animScale>
+                                      <p:cBhvr>
+                                        <p:cTn id="43" dur="26">
+                                          <p:stCondLst>
+                                            <p:cond delay="1642"/>
+                                          </p:stCondLst>
+                                        </p:cTn>
+                                        <p:tgtEl>
+                                          <p:spTgt spid="3">
+                                            <p:txEl>
+                                              <p:pRg st="1" end="1"/>
+                                            </p:txEl>
+                                          </p:spTgt>
+                                        </p:tgtEl>
+                                      </p:cBhvr>
+                                      <p:to x="100000" y="90000"/>
+                                    </p:animScale>
+                                    <p:animScale>
+                                      <p:cBhvr>
+                                        <p:cTn id="44" dur="166" decel="50000">
+                                          <p:stCondLst>
+                                            <p:cond delay="1668"/>
+                                          </p:stCondLst>
+                                        </p:cTn>
+                                        <p:tgtEl>
+                                          <p:spTgt spid="3">
+                                            <p:txEl>
+                                              <p:pRg st="1" end="1"/>
+                                            </p:txEl>
+                                          </p:spTgt>
+                                        </p:tgtEl>
+                                      </p:cBhvr>
+                                      <p:to x="100000" y="100000"/>
+                                    </p:animScale>
+                                    <p:animScale>
+                                      <p:cBhvr>
+                                        <p:cTn id="45" dur="26">
+                                          <p:stCondLst>
+                                            <p:cond delay="1808"/>
+                                          </p:stCondLst>
+                                        </p:cTn>
+                                        <p:tgtEl>
+                                          <p:spTgt spid="3">
+                                            <p:txEl>
+                                              <p:pRg st="1" end="1"/>
+                                            </p:txEl>
+                                          </p:spTgt>
+                                        </p:tgtEl>
+                                      </p:cBhvr>
+                                      <p:to x="100000" y="95000"/>
+                                    </p:animScale>
+                                    <p:animScale>
+                                      <p:cBhvr>
+                                        <p:cTn id="46" dur="166" decel="50000">
+                                          <p:stCondLst>
+                                            <p:cond delay="1834"/>
+                                          </p:stCondLst>
+                                        </p:cTn>
+                                        <p:tgtEl>
+                                          <p:spTgt spid="3">
+                                            <p:txEl>
+                                              <p:pRg st="1" end="1"/>
+                                            </p:txEl>
+                                          </p:spTgt>
+                                        </p:tgtEl>
+                                      </p:cBhvr>
+                                      <p:to x="100000" y="100000"/>
+                                    </p:animScale>
+                                  </p:childTnLst>
+                                </p:cTn>
+                              </p:par>
+                            </p:childTnLst>
+                          </p:cTn>
+                        </p:par>
+                      </p:childTnLst>
+                    </p:cTn>
+                  </p:par>
+                  <p:par>
+                    <p:cTn id="47" fill="hold">
+                      <p:stCondLst>
+                        <p:cond delay="indefinite"/>
+                      </p:stCondLst>
+                      <p:childTnLst>
+                        <p:par>
+                          <p:cTn id="48" fill="hold">
+                            <p:stCondLst>
+                              <p:cond delay="0"/>
+                            </p:stCondLst>
+                            <p:childTnLst>
+                              <p:par>
+                                <p:cTn id="49" presetID="26" presetClass="entr" presetSubtype="0" fill="hold" grpId="0" nodeType="clickEffect">
+                                  <p:stCondLst>
+                                    <p:cond delay="0"/>
+                                  </p:stCondLst>
+                                  <p:childTnLst>
+                                    <p:set>
+                                      <p:cBhvr>
+                                        <p:cTn id="50" dur="1" fill="hold">
+                                          <p:stCondLst>
+                                            <p:cond delay="0"/>
+                                          </p:stCondLst>
+                                        </p:cTn>
+                                        <p:tgtEl>
+                                          <p:spTgt spid="3">
+                                            <p:txEl>
+                                              <p:pRg st="2" end="2"/>
+                                            </p:txEl>
+                                          </p:spTgt>
+                                        </p:tgtEl>
+                                        <p:attrNameLst>
+                                          <p:attrName>style.visibility</p:attrName>
+                                        </p:attrNameLst>
+                                      </p:cBhvr>
+                                      <p:to>
+                                        <p:strVal val="visible"/>
+                                      </p:to>
+                                    </p:set>
+                                    <p:animEffect transition="in" filter="wipe(down)">
+                                      <p:cBhvr>
+                                        <p:cTn id="51" dur="580">
+                                          <p:stCondLst>
+                                            <p:cond delay="0"/>
+                                          </p:stCondLst>
+                                        </p:cTn>
+                                        <p:tgtEl>
+                                          <p:spTgt spid="3">
+                                            <p:txEl>
+                                              <p:pRg st="2" end="2"/>
+                                            </p:txEl>
+                                          </p:spTgt>
+                                        </p:tgtEl>
+                                      </p:cBhvr>
+                                    </p:animEffect>
+                                    <p:anim calcmode="lin" valueType="num">
+                                      <p:cBhvr>
+                                        <p:cTn id="52" dur="1822" tmFilter="0,0; 0.14,0.36; 0.43,0.73; 0.71,0.91; 1.0,1.0">
+                                          <p:stCondLst>
+                                            <p:cond delay="0"/>
+                                          </p:stCondLst>
+                                        </p:cTn>
+                                        <p:tgtEl>
+                                          <p:spTgt spid="3">
+                                            <p:txEl>
+                                              <p:pRg st="2" end="2"/>
+                                            </p:txEl>
+                                          </p:spTgt>
+                                        </p:tgtEl>
+                                        <p:attrNameLst>
+                                          <p:attrName>ppt_x</p:attrName>
+                                        </p:attrNameLst>
+                                      </p:cBhvr>
+                                      <p:tavLst>
+                                        <p:tav tm="0">
+                                          <p:val>
+                                            <p:strVal val="#ppt_x-0.25"/>
+                                          </p:val>
+                                        </p:tav>
+                                        <p:tav tm="100000">
+                                          <p:val>
+                                            <p:strVal val="#ppt_x"/>
+                                          </p:val>
+                                        </p:tav>
+                                      </p:tavLst>
+                                    </p:anim>
+                                    <p:anim calcmode="lin" valueType="num">
+                                      <p:cBhvr>
+                                        <p:cTn id="53" dur="664" tmFilter="0.0,0.0; 0.25,0.07; 0.50,0.2; 0.75,0.467; 1.0,1.0">
+                                          <p:stCondLst>
+                                            <p:cond delay="0"/>
+                                          </p:stCondLst>
+                                        </p:cTn>
+                                        <p:tgtEl>
+                                          <p:spTgt spid="3">
+                                            <p:txEl>
+                                              <p:pRg st="2" end="2"/>
+                                            </p:txEl>
+                                          </p:spTgt>
+                                        </p:tgtEl>
+                                        <p:attrNameLst>
+                                          <p:attrName>ppt_y</p:attrName>
+                                        </p:attrNameLst>
+                                      </p:cBhvr>
+                                      <p:tavLst>
+                                        <p:tav tm="0" fmla="#ppt_y-sin(pi*$)/3">
+                                          <p:val>
+                                            <p:fltVal val="0.5"/>
+                                          </p:val>
+                                        </p:tav>
+                                        <p:tav tm="100000">
+                                          <p:val>
+                                            <p:fltVal val="1"/>
+                                          </p:val>
+                                        </p:tav>
+                                      </p:tavLst>
+                                    </p:anim>
+                                    <p:anim calcmode="lin" valueType="num">
+                                      <p:cBhvr>
+                                        <p:cTn id="54" dur="664" tmFilter="0, 0; 0.125,0.2665; 0.25,0.4; 0.375,0.465; 0.5,0.5;  0.625,0.535; 0.75,0.6; 0.875,0.7335; 1,1">
+                                          <p:stCondLst>
+                                            <p:cond delay="664"/>
+                                          </p:stCondLst>
+                                        </p:cTn>
+                                        <p:tgtEl>
+                                          <p:spTgt spid="3">
+                                            <p:txEl>
+                                              <p:pRg st="2" end="2"/>
+                                            </p:txEl>
+                                          </p:spTgt>
+                                        </p:tgtEl>
+                                        <p:attrNameLst>
+                                          <p:attrName>ppt_y</p:attrName>
+                                        </p:attrNameLst>
+                                      </p:cBhvr>
+                                      <p:tavLst>
+                                        <p:tav tm="0" fmla="#ppt_y-sin(pi*$)/9">
+                                          <p:val>
+                                            <p:fltVal val="0"/>
+                                          </p:val>
+                                        </p:tav>
+                                        <p:tav tm="100000">
+                                          <p:val>
+                                            <p:fltVal val="1"/>
+                                          </p:val>
+                                        </p:tav>
+                                      </p:tavLst>
+                                    </p:anim>
+                                    <p:anim calcmode="lin" valueType="num">
+                                      <p:cBhvr>
+                                        <p:cTn id="55" dur="332" tmFilter="0, 0; 0.125,0.2665; 0.25,0.4; 0.375,0.465; 0.5,0.5;  0.625,0.535; 0.75,0.6; 0.875,0.7335; 1,1">
+                                          <p:stCondLst>
+                                            <p:cond delay="1324"/>
+                                          </p:stCondLst>
+                                        </p:cTn>
+                                        <p:tgtEl>
+                                          <p:spTgt spid="3">
+                                            <p:txEl>
+                                              <p:pRg st="2" end="2"/>
+                                            </p:txEl>
+                                          </p:spTgt>
+                                        </p:tgtEl>
+                                        <p:attrNameLst>
+                                          <p:attrName>ppt_y</p:attrName>
+                                        </p:attrNameLst>
+                                      </p:cBhvr>
+                                      <p:tavLst>
+                                        <p:tav tm="0" fmla="#ppt_y-sin(pi*$)/27">
+                                          <p:val>
+                                            <p:fltVal val="0"/>
+                                          </p:val>
+                                        </p:tav>
+                                        <p:tav tm="100000">
+                                          <p:val>
+                                            <p:fltVal val="1"/>
+                                          </p:val>
+                                        </p:tav>
+                                      </p:tavLst>
+                                    </p:anim>
+                                    <p:anim calcmode="lin" valueType="num">
+                                      <p:cBhvr>
+                                        <p:cTn id="56" dur="164" tmFilter="0, 0; 0.125,0.2665; 0.25,0.4; 0.375,0.465; 0.5,0.5;  0.625,0.535; 0.75,0.6; 0.875,0.7335; 1,1">
+                                          <p:stCondLst>
+                                            <p:cond delay="1656"/>
+                                          </p:stCondLst>
+                                        </p:cTn>
+                                        <p:tgtEl>
+                                          <p:spTgt spid="3">
+                                            <p:txEl>
+                                              <p:pRg st="2" end="2"/>
+                                            </p:txEl>
+                                          </p:spTgt>
+                                        </p:tgtEl>
+                                        <p:attrNameLst>
+                                          <p:attrName>ppt_y</p:attrName>
+                                        </p:attrNameLst>
+                                      </p:cBhvr>
+                                      <p:tavLst>
+                                        <p:tav tm="0" fmla="#ppt_y-sin(pi*$)/81">
+                                          <p:val>
+                                            <p:fltVal val="0"/>
+                                          </p:val>
+                                        </p:tav>
+                                        <p:tav tm="100000">
+                                          <p:val>
+                                            <p:fltVal val="1"/>
+                                          </p:val>
+                                        </p:tav>
+                                      </p:tavLst>
+                                    </p:anim>
+                                    <p:animScale>
+                                      <p:cBhvr>
+                                        <p:cTn id="57" dur="26">
+                                          <p:stCondLst>
+                                            <p:cond delay="650"/>
+                                          </p:stCondLst>
+                                        </p:cTn>
+                                        <p:tgtEl>
+                                          <p:spTgt spid="3">
+                                            <p:txEl>
+                                              <p:pRg st="2" end="2"/>
+                                            </p:txEl>
+                                          </p:spTgt>
+                                        </p:tgtEl>
+                                      </p:cBhvr>
+                                      <p:to x="100000" y="60000"/>
+                                    </p:animScale>
+                                    <p:animScale>
+                                      <p:cBhvr>
+                                        <p:cTn id="58" dur="166" decel="50000">
+                                          <p:stCondLst>
+                                            <p:cond delay="676"/>
+                                          </p:stCondLst>
+                                        </p:cTn>
+                                        <p:tgtEl>
+                                          <p:spTgt spid="3">
+                                            <p:txEl>
+                                              <p:pRg st="2" end="2"/>
+                                            </p:txEl>
+                                          </p:spTgt>
+                                        </p:tgtEl>
+                                      </p:cBhvr>
+                                      <p:to x="100000" y="100000"/>
+                                    </p:animScale>
+                                    <p:animScale>
+                                      <p:cBhvr>
+                                        <p:cTn id="59" dur="26">
+                                          <p:stCondLst>
+                                            <p:cond delay="1312"/>
+                                          </p:stCondLst>
+                                        </p:cTn>
+                                        <p:tgtEl>
+                                          <p:spTgt spid="3">
+                                            <p:txEl>
+                                              <p:pRg st="2" end="2"/>
+                                            </p:txEl>
+                                          </p:spTgt>
+                                        </p:tgtEl>
+                                      </p:cBhvr>
+                                      <p:to x="100000" y="80000"/>
+                                    </p:animScale>
+                                    <p:animScale>
+                                      <p:cBhvr>
+                                        <p:cTn id="60" dur="166" decel="50000">
+                                          <p:stCondLst>
+                                            <p:cond delay="1338"/>
+                                          </p:stCondLst>
+                                        </p:cTn>
+                                        <p:tgtEl>
+                                          <p:spTgt spid="3">
+                                            <p:txEl>
+                                              <p:pRg st="2" end="2"/>
+                                            </p:txEl>
+                                          </p:spTgt>
+                                        </p:tgtEl>
+                                      </p:cBhvr>
+                                      <p:to x="100000" y="100000"/>
+                                    </p:animScale>
+                                    <p:animScale>
+                                      <p:cBhvr>
+                                        <p:cTn id="61" dur="26">
+                                          <p:stCondLst>
+                                            <p:cond delay="1642"/>
+                                          </p:stCondLst>
+                                        </p:cTn>
+                                        <p:tgtEl>
+                                          <p:spTgt spid="3">
+                                            <p:txEl>
+                                              <p:pRg st="2" end="2"/>
+                                            </p:txEl>
+                                          </p:spTgt>
+                                        </p:tgtEl>
+                                      </p:cBhvr>
+                                      <p:to x="100000" y="90000"/>
+                                    </p:animScale>
+                                    <p:animScale>
+                                      <p:cBhvr>
+                                        <p:cTn id="62" dur="166" decel="50000">
+                                          <p:stCondLst>
+                                            <p:cond delay="1668"/>
+                                          </p:stCondLst>
+                                        </p:cTn>
+                                        <p:tgtEl>
+                                          <p:spTgt spid="3">
+                                            <p:txEl>
+                                              <p:pRg st="2" end="2"/>
+                                            </p:txEl>
+                                          </p:spTgt>
+                                        </p:tgtEl>
+                                      </p:cBhvr>
+                                      <p:to x="100000" y="100000"/>
+                                    </p:animScale>
+                                    <p:animScale>
+                                      <p:cBhvr>
+                                        <p:cTn id="63" dur="26">
+                                          <p:stCondLst>
+                                            <p:cond delay="1808"/>
+                                          </p:stCondLst>
+                                        </p:cTn>
+                                        <p:tgtEl>
+                                          <p:spTgt spid="3">
+                                            <p:txEl>
+                                              <p:pRg st="2" end="2"/>
+                                            </p:txEl>
+                                          </p:spTgt>
+                                        </p:tgtEl>
+                                      </p:cBhvr>
+                                      <p:to x="100000" y="95000"/>
+                                    </p:animScale>
+                                    <p:animScale>
+                                      <p:cBhvr>
+                                        <p:cTn id="64" dur="166" decel="50000">
+                                          <p:stCondLst>
+                                            <p:cond delay="1834"/>
+                                          </p:stCondLst>
+                                        </p:cTn>
+                                        <p:tgtEl>
+                                          <p:spTgt spid="3">
+                                            <p:txEl>
+                                              <p:pRg st="2" end="2"/>
+                                            </p:txEl>
+                                          </p:spTgt>
+                                        </p:tgtEl>
+                                      </p:cBhvr>
+                                      <p:to x="100000" y="100000"/>
+                                    </p:animScale>
+                                  </p:childTnLst>
+                                </p:cTn>
+                              </p:par>
+                            </p:childTnLst>
+                          </p:cTn>
+                        </p:par>
+                      </p:childTnLst>
+                    </p:cTn>
+                  </p:par>
+                  <p:par>
+                    <p:cTn id="65" fill="hold">
+                      <p:stCondLst>
+                        <p:cond delay="indefinite"/>
+                      </p:stCondLst>
+                      <p:childTnLst>
+                        <p:par>
+                          <p:cTn id="66" fill="hold">
+                            <p:stCondLst>
+                              <p:cond delay="0"/>
+                            </p:stCondLst>
+                            <p:childTnLst>
+                              <p:par>
+                                <p:cTn id="67" presetID="10" presetClass="entr" presetSubtype="0" fill="hold" nodeType="clickEffect">
+                                  <p:stCondLst>
+                                    <p:cond delay="0"/>
+                                  </p:stCondLst>
+                                  <p:childTnLst>
+                                    <p:set>
+                                      <p:cBhvr>
+                                        <p:cTn id="68" dur="1" fill="hold">
+                                          <p:stCondLst>
+                                            <p:cond delay="0"/>
+                                          </p:stCondLst>
+                                        </p:cTn>
+                                        <p:tgtEl>
+                                          <p:spTgt spid="5124"/>
+                                        </p:tgtEl>
+                                        <p:attrNameLst>
+                                          <p:attrName>style.visibility</p:attrName>
+                                        </p:attrNameLst>
+                                      </p:cBhvr>
+                                      <p:to>
+                                        <p:strVal val="visible"/>
+                                      </p:to>
+                                    </p:set>
+                                    <p:animEffect transition="in" filter="fade">
+                                      <p:cBhvr>
+                                        <p:cTn id="69" dur="500"/>
+                                        <p:tgtEl>
+                                          <p:spTgt spid="5124"/>
+                                        </p:tgtEl>
+                                      </p:cBhvr>
+                                    </p:animEffect>
+                                  </p:childTnLst>
+                                </p:cTn>
+                              </p:par>
+                            </p:childTnLst>
+                          </p:cTn>
+                        </p:par>
+                      </p:childTnLst>
+                    </p:cTn>
+                  </p:par>
                 </p:childTnLst>
               </p:cTn>
               <p:prevCondLst>
@@ -18136,6 +19717,7 @@
     </p:tnLst>
     <p:bldLst>
       <p:bldP spid="2" grpId="0"/>
+      <p:bldP spid="3" grpId="0" build="p"/>
     </p:bldLst>
   </p:timing>
 </p:sld>

</xml_diff>